<commit_message>
Started to add the capability to execute a graph directly on a cluster
</commit_message>
<xml_diff>
--- a/Resources/Documentation/Architecture.pptx
+++ b/Resources/Documentation/Architecture.pptx
@@ -5,10 +5,13 @@
     <p:sldMasterId id="2147483648" r:id="rId1"/>
   </p:sldMasterIdLst>
   <p:sldIdLst>
-    <p:sldId id="256" r:id="rId2"/>
-    <p:sldId id="258" r:id="rId3"/>
-    <p:sldId id="257" r:id="rId4"/>
-    <p:sldId id="259" r:id="rId5"/>
+    <p:sldId id="260" r:id="rId2"/>
+    <p:sldId id="261" r:id="rId3"/>
+    <p:sldId id="262" r:id="rId4"/>
+    <p:sldId id="256" r:id="rId5"/>
+    <p:sldId id="258" r:id="rId6"/>
+    <p:sldId id="257" r:id="rId7"/>
+    <p:sldId id="259" r:id="rId8"/>
   </p:sldIdLst>
   <p:sldSz cx="9144000" cy="6858000" type="screen4x3"/>
   <p:notesSz cx="6858000" cy="9144000"/>
@@ -292,7 +295,7 @@
             <a:fld id="{1D8BD707-D9CF-40AE-B4C6-C98DA3205C09}" type="datetimeFigureOut">
               <a:rPr lang="en-US" smtClean="0"/>
               <a:pPr/>
-              <a:t>3/9/2012</a:t>
+              <a:t>12/24/2012</a:t>
             </a:fld>
             <a:endParaRPr lang="en-US"/>
           </a:p>
@@ -459,7 +462,7 @@
             <a:fld id="{1D8BD707-D9CF-40AE-B4C6-C98DA3205C09}" type="datetimeFigureOut">
               <a:rPr lang="en-US" smtClean="0"/>
               <a:pPr/>
-              <a:t>3/9/2012</a:t>
+              <a:t>12/24/2012</a:t>
             </a:fld>
             <a:endParaRPr lang="en-US"/>
           </a:p>
@@ -636,7 +639,7 @@
             <a:fld id="{1D8BD707-D9CF-40AE-B4C6-C98DA3205C09}" type="datetimeFigureOut">
               <a:rPr lang="en-US" smtClean="0"/>
               <a:pPr/>
-              <a:t>3/9/2012</a:t>
+              <a:t>12/24/2012</a:t>
             </a:fld>
             <a:endParaRPr lang="en-US"/>
           </a:p>
@@ -803,7 +806,7 @@
             <a:fld id="{1D8BD707-D9CF-40AE-B4C6-C98DA3205C09}" type="datetimeFigureOut">
               <a:rPr lang="en-US" smtClean="0"/>
               <a:pPr/>
-              <a:t>3/9/2012</a:t>
+              <a:t>12/24/2012</a:t>
             </a:fld>
             <a:endParaRPr lang="en-US"/>
           </a:p>
@@ -1046,7 +1049,7 @@
             <a:fld id="{1D8BD707-D9CF-40AE-B4C6-C98DA3205C09}" type="datetimeFigureOut">
               <a:rPr lang="en-US" smtClean="0"/>
               <a:pPr/>
-              <a:t>3/9/2012</a:t>
+              <a:t>12/24/2012</a:t>
             </a:fld>
             <a:endParaRPr lang="en-US"/>
           </a:p>
@@ -1331,7 +1334,7 @@
             <a:fld id="{1D8BD707-D9CF-40AE-B4C6-C98DA3205C09}" type="datetimeFigureOut">
               <a:rPr lang="en-US" smtClean="0"/>
               <a:pPr/>
-              <a:t>3/9/2012</a:t>
+              <a:t>12/24/2012</a:t>
             </a:fld>
             <a:endParaRPr lang="en-US"/>
           </a:p>
@@ -1750,7 +1753,7 @@
             <a:fld id="{1D8BD707-D9CF-40AE-B4C6-C98DA3205C09}" type="datetimeFigureOut">
               <a:rPr lang="en-US" smtClean="0"/>
               <a:pPr/>
-              <a:t>3/9/2012</a:t>
+              <a:t>12/24/2012</a:t>
             </a:fld>
             <a:endParaRPr lang="en-US"/>
           </a:p>
@@ -1865,7 +1868,7 @@
             <a:fld id="{1D8BD707-D9CF-40AE-B4C6-C98DA3205C09}" type="datetimeFigureOut">
               <a:rPr lang="en-US" smtClean="0"/>
               <a:pPr/>
-              <a:t>3/9/2012</a:t>
+              <a:t>12/24/2012</a:t>
             </a:fld>
             <a:endParaRPr lang="en-US"/>
           </a:p>
@@ -1957,7 +1960,7 @@
             <a:fld id="{1D8BD707-D9CF-40AE-B4C6-C98DA3205C09}" type="datetimeFigureOut">
               <a:rPr lang="en-US" smtClean="0"/>
               <a:pPr/>
-              <a:t>3/9/2012</a:t>
+              <a:t>12/24/2012</a:t>
             </a:fld>
             <a:endParaRPr lang="en-US"/>
           </a:p>
@@ -2231,7 +2234,7 @@
             <a:fld id="{1D8BD707-D9CF-40AE-B4C6-C98DA3205C09}" type="datetimeFigureOut">
               <a:rPr lang="en-US" smtClean="0"/>
               <a:pPr/>
-              <a:t>3/9/2012</a:t>
+              <a:t>12/24/2012</a:t>
             </a:fld>
             <a:endParaRPr lang="en-US"/>
           </a:p>
@@ -2481,7 +2484,7 @@
             <a:fld id="{1D8BD707-D9CF-40AE-B4C6-C98DA3205C09}" type="datetimeFigureOut">
               <a:rPr lang="en-US" smtClean="0"/>
               <a:pPr/>
-              <a:t>3/9/2012</a:t>
+              <a:t>12/24/2012</a:t>
             </a:fld>
             <a:endParaRPr lang="en-US"/>
           </a:p>
@@ -2691,7 +2694,7 @@
             <a:fld id="{1D8BD707-D9CF-40AE-B4C6-C98DA3205C09}" type="datetimeFigureOut">
               <a:rPr lang="en-US" smtClean="0"/>
               <a:pPr/>
-              <a:t>3/9/2012</a:t>
+              <a:t>12/24/2012</a:t>
             </a:fld>
             <a:endParaRPr lang="en-US"/>
           </a:p>
@@ -3064,6 +3067,3103 @@
       </p:grpSpPr>
       <p:sp>
         <p:nvSpPr>
+          <p:cNvPr id="4" name="Rounded Rectangle 3"/>
+          <p:cNvSpPr/>
+          <p:nvPr/>
+        </p:nvSpPr>
+        <p:spPr>
+          <a:xfrm>
+            <a:off x="1340038" y="1807029"/>
+            <a:ext cx="1371600" cy="1219200"/>
+          </a:xfrm>
+          <a:prstGeom prst="roundRect">
+            <a:avLst/>
+          </a:prstGeom>
+          <a:solidFill>
+            <a:schemeClr val="bg2"/>
+          </a:solidFill>
+          <a:ln w="38100">
+            <a:solidFill>
+              <a:schemeClr val="tx1"/>
+            </a:solidFill>
+          </a:ln>
+          <a:effectLst>
+            <a:outerShdw blurRad="50800" dist="38100" dir="2700000" algn="tl" rotWithShape="0">
+              <a:prstClr val="black">
+                <a:alpha val="40000"/>
+              </a:prstClr>
+            </a:outerShdw>
+          </a:effectLst>
+        </p:spPr>
+        <p:style>
+          <a:lnRef idx="2">
+            <a:schemeClr val="accent1">
+              <a:shade val="50000"/>
+            </a:schemeClr>
+          </a:lnRef>
+          <a:fillRef idx="1">
+            <a:schemeClr val="accent1"/>
+          </a:fillRef>
+          <a:effectRef idx="0">
+            <a:schemeClr val="accent1"/>
+          </a:effectRef>
+          <a:fontRef idx="minor">
+            <a:schemeClr val="lt1"/>
+          </a:fontRef>
+        </p:style>
+        <p:txBody>
+          <a:bodyPr rtlCol="0" anchor="ctr"/>
+          <a:lstStyle/>
+          <a:p>
+            <a:pPr algn="ctr"/>
+            <a:r>
+              <a:rPr lang="en-US" b="1" dirty="0" smtClean="0">
+                <a:solidFill>
+                  <a:schemeClr val="tx1"/>
+                </a:solidFill>
+              </a:rPr>
+              <a:t>IDE on Desktop</a:t>
+            </a:r>
+            <a:endParaRPr lang="en-US" b="1" dirty="0">
+              <a:solidFill>
+                <a:schemeClr val="tx1"/>
+              </a:solidFill>
+            </a:endParaRPr>
+          </a:p>
+        </p:txBody>
+      </p:sp>
+      <p:sp>
+        <p:nvSpPr>
+          <p:cNvPr id="5" name="Rectangle 4"/>
+          <p:cNvSpPr/>
+          <p:nvPr/>
+        </p:nvSpPr>
+        <p:spPr>
+          <a:xfrm>
+            <a:off x="1629174" y="2890745"/>
+            <a:ext cx="811441" cy="276999"/>
+          </a:xfrm>
+          <a:prstGeom prst="rect">
+            <a:avLst/>
+          </a:prstGeom>
+          <a:solidFill>
+            <a:srgbClr val="FFFFCC"/>
+          </a:solidFill>
+          <a:ln>
+            <a:solidFill>
+              <a:schemeClr val="tx1"/>
+            </a:solidFill>
+          </a:ln>
+          <a:effectLst>
+            <a:outerShdw blurRad="50800" dist="38100" dir="2700000" algn="tl" rotWithShape="0">
+              <a:prstClr val="black">
+                <a:alpha val="40000"/>
+              </a:prstClr>
+            </a:outerShdw>
+          </a:effectLst>
+        </p:spPr>
+        <p:txBody>
+          <a:bodyPr wrap="none">
+            <a:spAutoFit/>
+          </a:bodyPr>
+          <a:lstStyle/>
+          <a:p>
+            <a:r>
+              <a:rPr lang="en-US" sz="1200" dirty="0" smtClean="0"/>
+              <a:t>Hoop.java</a:t>
+            </a:r>
+            <a:endParaRPr lang="en-US" sz="1200" dirty="0"/>
+          </a:p>
+        </p:txBody>
+      </p:sp>
+      <p:sp>
+        <p:nvSpPr>
+          <p:cNvPr id="6" name="Rounded Rectangle 5"/>
+          <p:cNvSpPr/>
+          <p:nvPr/>
+        </p:nvSpPr>
+        <p:spPr>
+          <a:xfrm>
+            <a:off x="4464238" y="1807030"/>
+            <a:ext cx="1371600" cy="1219200"/>
+          </a:xfrm>
+          <a:prstGeom prst="roundRect">
+            <a:avLst/>
+          </a:prstGeom>
+          <a:solidFill>
+            <a:schemeClr val="bg2"/>
+          </a:solidFill>
+          <a:ln w="38100">
+            <a:solidFill>
+              <a:schemeClr val="tx1"/>
+            </a:solidFill>
+          </a:ln>
+          <a:effectLst>
+            <a:outerShdw blurRad="50800" dist="38100" dir="2700000" algn="tl" rotWithShape="0">
+              <a:prstClr val="black">
+                <a:alpha val="40000"/>
+              </a:prstClr>
+            </a:outerShdw>
+          </a:effectLst>
+        </p:spPr>
+        <p:style>
+          <a:lnRef idx="2">
+            <a:schemeClr val="accent1">
+              <a:shade val="50000"/>
+            </a:schemeClr>
+          </a:lnRef>
+          <a:fillRef idx="1">
+            <a:schemeClr val="accent1"/>
+          </a:fillRef>
+          <a:effectRef idx="0">
+            <a:schemeClr val="accent1"/>
+          </a:effectRef>
+          <a:fontRef idx="minor">
+            <a:schemeClr val="lt1"/>
+          </a:fontRef>
+        </p:style>
+        <p:txBody>
+          <a:bodyPr rtlCol="0" anchor="ctr"/>
+          <a:lstStyle/>
+          <a:p>
+            <a:pPr algn="ctr"/>
+            <a:r>
+              <a:rPr lang="en-US" b="1" dirty="0" smtClean="0">
+                <a:solidFill>
+                  <a:schemeClr val="tx1"/>
+                </a:solidFill>
+              </a:rPr>
+              <a:t>Broker on Cluster Login Node</a:t>
+            </a:r>
+            <a:endParaRPr lang="en-US" b="1" dirty="0">
+              <a:solidFill>
+                <a:schemeClr val="tx1"/>
+              </a:solidFill>
+            </a:endParaRPr>
+          </a:p>
+        </p:txBody>
+      </p:sp>
+      <p:sp>
+        <p:nvSpPr>
+          <p:cNvPr id="8" name="Rectangle 7"/>
+          <p:cNvSpPr/>
+          <p:nvPr/>
+        </p:nvSpPr>
+        <p:spPr>
+          <a:xfrm>
+            <a:off x="4288916" y="2921588"/>
+            <a:ext cx="1739130" cy="276999"/>
+          </a:xfrm>
+          <a:prstGeom prst="rect">
+            <a:avLst/>
+          </a:prstGeom>
+          <a:solidFill>
+            <a:srgbClr val="FFFFCC"/>
+          </a:solidFill>
+          <a:ln>
+            <a:solidFill>
+              <a:schemeClr val="tx1"/>
+            </a:solidFill>
+          </a:ln>
+          <a:effectLst>
+            <a:outerShdw blurRad="50800" dist="38100" dir="2700000" algn="tl" rotWithShape="0">
+              <a:prstClr val="black">
+                <a:alpha val="40000"/>
+              </a:prstClr>
+            </a:outerShdw>
+          </a:effectLst>
+        </p:spPr>
+        <p:txBody>
+          <a:bodyPr wrap="none">
+            <a:spAutoFit/>
+          </a:bodyPr>
+          <a:lstStyle/>
+          <a:p>
+            <a:r>
+              <a:rPr lang="en-US" sz="1200" dirty="0" smtClean="0"/>
+              <a:t>Hoop.HadoopBroker.java</a:t>
+            </a:r>
+            <a:endParaRPr lang="en-US" sz="1200" dirty="0"/>
+          </a:p>
+        </p:txBody>
+      </p:sp>
+      <p:cxnSp>
+        <p:nvCxnSpPr>
+          <p:cNvPr id="9" name="Straight Arrow Connector 8"/>
+          <p:cNvCxnSpPr>
+            <a:stCxn id="4" idx="3"/>
+            <a:endCxn id="6" idx="1"/>
+          </p:cNvCxnSpPr>
+          <p:nvPr/>
+        </p:nvCxnSpPr>
+        <p:spPr>
+          <a:xfrm>
+            <a:off x="2711638" y="2416629"/>
+            <a:ext cx="1752600" cy="1"/>
+          </a:xfrm>
+          <a:prstGeom prst="straightConnector1">
+            <a:avLst/>
+          </a:prstGeom>
+          <a:ln w="38100">
+            <a:solidFill>
+              <a:schemeClr val="tx1"/>
+            </a:solidFill>
+            <a:tailEnd type="triangle" w="lg" len="med"/>
+          </a:ln>
+        </p:spPr>
+        <p:style>
+          <a:lnRef idx="1">
+            <a:schemeClr val="accent1"/>
+          </a:lnRef>
+          <a:fillRef idx="0">
+            <a:schemeClr val="accent1"/>
+          </a:fillRef>
+          <a:effectRef idx="0">
+            <a:schemeClr val="accent1"/>
+          </a:effectRef>
+          <a:fontRef idx="minor">
+            <a:schemeClr val="tx1"/>
+          </a:fontRef>
+        </p:style>
+      </p:cxnSp>
+      <p:sp>
+        <p:nvSpPr>
+          <p:cNvPr id="12" name="Rounded Rectangle 11"/>
+          <p:cNvSpPr/>
+          <p:nvPr/>
+        </p:nvSpPr>
+        <p:spPr>
+          <a:xfrm>
+            <a:off x="2140138" y="4613730"/>
+            <a:ext cx="1371600" cy="1219200"/>
+          </a:xfrm>
+          <a:prstGeom prst="roundRect">
+            <a:avLst/>
+          </a:prstGeom>
+          <a:solidFill>
+            <a:schemeClr val="bg2"/>
+          </a:solidFill>
+          <a:ln w="38100">
+            <a:solidFill>
+              <a:schemeClr val="tx1"/>
+            </a:solidFill>
+          </a:ln>
+          <a:effectLst>
+            <a:outerShdw blurRad="50800" dist="38100" dir="2700000" algn="tl" rotWithShape="0">
+              <a:prstClr val="black">
+                <a:alpha val="40000"/>
+              </a:prstClr>
+            </a:outerShdw>
+          </a:effectLst>
+        </p:spPr>
+        <p:style>
+          <a:lnRef idx="2">
+            <a:schemeClr val="accent1">
+              <a:shade val="50000"/>
+            </a:schemeClr>
+          </a:lnRef>
+          <a:fillRef idx="1">
+            <a:schemeClr val="accent1"/>
+          </a:fillRef>
+          <a:effectRef idx="0">
+            <a:schemeClr val="accent1"/>
+          </a:effectRef>
+          <a:fontRef idx="minor">
+            <a:schemeClr val="lt1"/>
+          </a:fontRef>
+        </p:style>
+        <p:txBody>
+          <a:bodyPr rtlCol="0" anchor="ctr"/>
+          <a:lstStyle/>
+          <a:p>
+            <a:pPr algn="ctr"/>
+            <a:r>
+              <a:rPr lang="en-US" b="1" dirty="0" smtClean="0">
+                <a:solidFill>
+                  <a:schemeClr val="tx1"/>
+                </a:solidFill>
+              </a:rPr>
+              <a:t>Cluster  Node</a:t>
+            </a:r>
+            <a:endParaRPr lang="en-US" b="1" dirty="0">
+              <a:solidFill>
+                <a:schemeClr val="tx1"/>
+              </a:solidFill>
+            </a:endParaRPr>
+          </a:p>
+        </p:txBody>
+      </p:sp>
+      <p:cxnSp>
+        <p:nvCxnSpPr>
+          <p:cNvPr id="13" name="Straight Arrow Connector 12"/>
+          <p:cNvCxnSpPr>
+            <a:stCxn id="8" idx="2"/>
+            <a:endCxn id="12" idx="0"/>
+          </p:cNvCxnSpPr>
+          <p:nvPr/>
+        </p:nvCxnSpPr>
+        <p:spPr>
+          <a:xfrm flipH="1">
+            <a:off x="2825938" y="3198587"/>
+            <a:ext cx="2332543" cy="1415143"/>
+          </a:xfrm>
+          <a:prstGeom prst="straightConnector1">
+            <a:avLst/>
+          </a:prstGeom>
+          <a:ln w="38100">
+            <a:solidFill>
+              <a:schemeClr val="tx1"/>
+            </a:solidFill>
+            <a:tailEnd type="triangle" w="lg" len="med"/>
+          </a:ln>
+        </p:spPr>
+        <p:style>
+          <a:lnRef idx="1">
+            <a:schemeClr val="accent1"/>
+          </a:lnRef>
+          <a:fillRef idx="0">
+            <a:schemeClr val="accent1"/>
+          </a:fillRef>
+          <a:effectRef idx="0">
+            <a:schemeClr val="accent1"/>
+          </a:effectRef>
+          <a:fontRef idx="minor">
+            <a:schemeClr val="tx1"/>
+          </a:fontRef>
+        </p:style>
+      </p:cxnSp>
+      <p:sp>
+        <p:nvSpPr>
+          <p:cNvPr id="16" name="Rounded Rectangle 15"/>
+          <p:cNvSpPr/>
+          <p:nvPr/>
+        </p:nvSpPr>
+        <p:spPr>
+          <a:xfrm>
+            <a:off x="4413438" y="4601030"/>
+            <a:ext cx="1371600" cy="1219200"/>
+          </a:xfrm>
+          <a:prstGeom prst="roundRect">
+            <a:avLst/>
+          </a:prstGeom>
+          <a:solidFill>
+            <a:schemeClr val="bg2"/>
+          </a:solidFill>
+          <a:ln w="38100">
+            <a:solidFill>
+              <a:schemeClr val="tx1"/>
+            </a:solidFill>
+          </a:ln>
+          <a:effectLst>
+            <a:outerShdw blurRad="50800" dist="38100" dir="2700000" algn="tl" rotWithShape="0">
+              <a:prstClr val="black">
+                <a:alpha val="40000"/>
+              </a:prstClr>
+            </a:outerShdw>
+          </a:effectLst>
+        </p:spPr>
+        <p:style>
+          <a:lnRef idx="2">
+            <a:schemeClr val="accent1">
+              <a:shade val="50000"/>
+            </a:schemeClr>
+          </a:lnRef>
+          <a:fillRef idx="1">
+            <a:schemeClr val="accent1"/>
+          </a:fillRef>
+          <a:effectRef idx="0">
+            <a:schemeClr val="accent1"/>
+          </a:effectRef>
+          <a:fontRef idx="minor">
+            <a:schemeClr val="lt1"/>
+          </a:fontRef>
+        </p:style>
+        <p:txBody>
+          <a:bodyPr rtlCol="0" anchor="ctr"/>
+          <a:lstStyle/>
+          <a:p>
+            <a:pPr algn="ctr"/>
+            <a:r>
+              <a:rPr lang="en-US" b="1" dirty="0" smtClean="0">
+                <a:solidFill>
+                  <a:schemeClr val="tx1"/>
+                </a:solidFill>
+              </a:rPr>
+              <a:t>Cluster  Node</a:t>
+            </a:r>
+            <a:endParaRPr lang="en-US" b="1" dirty="0">
+              <a:solidFill>
+                <a:schemeClr val="tx1"/>
+              </a:solidFill>
+            </a:endParaRPr>
+          </a:p>
+        </p:txBody>
+      </p:sp>
+      <p:sp>
+        <p:nvSpPr>
+          <p:cNvPr id="17" name="Rounded Rectangle 16"/>
+          <p:cNvSpPr/>
+          <p:nvPr/>
+        </p:nvSpPr>
+        <p:spPr>
+          <a:xfrm>
+            <a:off x="6521638" y="4588330"/>
+            <a:ext cx="1371600" cy="1219200"/>
+          </a:xfrm>
+          <a:prstGeom prst="roundRect">
+            <a:avLst/>
+          </a:prstGeom>
+          <a:solidFill>
+            <a:schemeClr val="bg2"/>
+          </a:solidFill>
+          <a:ln w="38100">
+            <a:solidFill>
+              <a:schemeClr val="tx1"/>
+            </a:solidFill>
+          </a:ln>
+          <a:effectLst>
+            <a:outerShdw blurRad="50800" dist="38100" dir="2700000" algn="tl" rotWithShape="0">
+              <a:prstClr val="black">
+                <a:alpha val="40000"/>
+              </a:prstClr>
+            </a:outerShdw>
+          </a:effectLst>
+        </p:spPr>
+        <p:style>
+          <a:lnRef idx="2">
+            <a:schemeClr val="accent1">
+              <a:shade val="50000"/>
+            </a:schemeClr>
+          </a:lnRef>
+          <a:fillRef idx="1">
+            <a:schemeClr val="accent1"/>
+          </a:fillRef>
+          <a:effectRef idx="0">
+            <a:schemeClr val="accent1"/>
+          </a:effectRef>
+          <a:fontRef idx="minor">
+            <a:schemeClr val="lt1"/>
+          </a:fontRef>
+        </p:style>
+        <p:txBody>
+          <a:bodyPr rtlCol="0" anchor="ctr"/>
+          <a:lstStyle/>
+          <a:p>
+            <a:pPr algn="ctr"/>
+            <a:r>
+              <a:rPr lang="en-US" b="1" dirty="0" smtClean="0">
+                <a:solidFill>
+                  <a:schemeClr val="tx1"/>
+                </a:solidFill>
+              </a:rPr>
+              <a:t>Cluster  Node</a:t>
+            </a:r>
+            <a:endParaRPr lang="en-US" b="1" dirty="0">
+              <a:solidFill>
+                <a:schemeClr val="tx1"/>
+              </a:solidFill>
+            </a:endParaRPr>
+          </a:p>
+        </p:txBody>
+      </p:sp>
+      <p:cxnSp>
+        <p:nvCxnSpPr>
+          <p:cNvPr id="18" name="Straight Arrow Connector 17"/>
+          <p:cNvCxnSpPr>
+            <a:stCxn id="8" idx="2"/>
+            <a:endCxn id="16" idx="0"/>
+          </p:cNvCxnSpPr>
+          <p:nvPr/>
+        </p:nvCxnSpPr>
+        <p:spPr>
+          <a:xfrm flipH="1">
+            <a:off x="5099238" y="3198587"/>
+            <a:ext cx="59243" cy="1402443"/>
+          </a:xfrm>
+          <a:prstGeom prst="straightConnector1">
+            <a:avLst/>
+          </a:prstGeom>
+          <a:ln w="38100">
+            <a:solidFill>
+              <a:schemeClr val="tx1"/>
+            </a:solidFill>
+            <a:tailEnd type="triangle" w="lg" len="med"/>
+          </a:ln>
+        </p:spPr>
+        <p:style>
+          <a:lnRef idx="1">
+            <a:schemeClr val="accent1"/>
+          </a:lnRef>
+          <a:fillRef idx="0">
+            <a:schemeClr val="accent1"/>
+          </a:fillRef>
+          <a:effectRef idx="0">
+            <a:schemeClr val="accent1"/>
+          </a:effectRef>
+          <a:fontRef idx="minor">
+            <a:schemeClr val="tx1"/>
+          </a:fontRef>
+        </p:style>
+      </p:cxnSp>
+      <p:cxnSp>
+        <p:nvCxnSpPr>
+          <p:cNvPr id="21" name="Straight Arrow Connector 20"/>
+          <p:cNvCxnSpPr>
+            <a:stCxn id="8" idx="2"/>
+            <a:endCxn id="17" idx="0"/>
+          </p:cNvCxnSpPr>
+          <p:nvPr/>
+        </p:nvCxnSpPr>
+        <p:spPr>
+          <a:xfrm>
+            <a:off x="5158481" y="3198587"/>
+            <a:ext cx="2048957" cy="1389743"/>
+          </a:xfrm>
+          <a:prstGeom prst="straightConnector1">
+            <a:avLst/>
+          </a:prstGeom>
+          <a:ln w="38100">
+            <a:solidFill>
+              <a:schemeClr val="tx1"/>
+            </a:solidFill>
+            <a:tailEnd type="triangle" w="lg" len="med"/>
+          </a:ln>
+        </p:spPr>
+        <p:style>
+          <a:lnRef idx="1">
+            <a:schemeClr val="accent1"/>
+          </a:lnRef>
+          <a:fillRef idx="0">
+            <a:schemeClr val="accent1"/>
+          </a:fillRef>
+          <a:effectRef idx="0">
+            <a:schemeClr val="accent1"/>
+          </a:effectRef>
+          <a:fontRef idx="minor">
+            <a:schemeClr val="tx1"/>
+          </a:fontRef>
+        </p:style>
+      </p:cxnSp>
+      <p:sp>
+        <p:nvSpPr>
+          <p:cNvPr id="40" name="Oval 39"/>
+          <p:cNvSpPr/>
+          <p:nvPr/>
+        </p:nvSpPr>
+        <p:spPr>
+          <a:xfrm>
+            <a:off x="141514" y="141515"/>
+            <a:ext cx="506185" cy="506185"/>
+          </a:xfrm>
+          <a:prstGeom prst="ellipse">
+            <a:avLst/>
+          </a:prstGeom>
+          <a:solidFill>
+            <a:schemeClr val="bg1"/>
+          </a:solidFill>
+          <a:ln>
+            <a:solidFill>
+              <a:schemeClr val="tx1"/>
+            </a:solidFill>
+          </a:ln>
+          <a:effectLst>
+            <a:outerShdw blurRad="50800" dist="38100" dir="2700000" algn="tl" rotWithShape="0">
+              <a:prstClr val="black">
+                <a:alpha val="40000"/>
+              </a:prstClr>
+            </a:outerShdw>
+          </a:effectLst>
+        </p:spPr>
+        <p:style>
+          <a:lnRef idx="2">
+            <a:schemeClr val="accent1">
+              <a:shade val="50000"/>
+            </a:schemeClr>
+          </a:lnRef>
+          <a:fillRef idx="1">
+            <a:schemeClr val="accent1"/>
+          </a:fillRef>
+          <a:effectRef idx="0">
+            <a:schemeClr val="accent1"/>
+          </a:effectRef>
+          <a:fontRef idx="minor">
+            <a:schemeClr val="lt1"/>
+          </a:fontRef>
+        </p:style>
+        <p:txBody>
+          <a:bodyPr rtlCol="0" anchor="ctr"/>
+          <a:lstStyle/>
+          <a:p>
+            <a:pPr algn="ctr"/>
+            <a:r>
+              <a:rPr lang="en-US" sz="3200" b="1" dirty="0" smtClean="0">
+                <a:solidFill>
+                  <a:schemeClr val="tx1"/>
+                </a:solidFill>
+              </a:rPr>
+              <a:t>1</a:t>
+            </a:r>
+            <a:endParaRPr lang="en-US" sz="3200" b="1" dirty="0">
+              <a:solidFill>
+                <a:schemeClr val="tx1"/>
+              </a:solidFill>
+            </a:endParaRPr>
+          </a:p>
+        </p:txBody>
+      </p:sp>
+      <p:sp>
+        <p:nvSpPr>
+          <p:cNvPr id="41" name="TextBox 40"/>
+          <p:cNvSpPr txBox="1"/>
+          <p:nvPr/>
+        </p:nvSpPr>
+        <p:spPr>
+          <a:xfrm>
+            <a:off x="723900" y="152400"/>
+            <a:ext cx="2955553" cy="523220"/>
+          </a:xfrm>
+          <a:prstGeom prst="rect">
+            <a:avLst/>
+          </a:prstGeom>
+          <a:noFill/>
+        </p:spPr>
+        <p:txBody>
+          <a:bodyPr wrap="none" rtlCol="0">
+            <a:spAutoFit/>
+          </a:bodyPr>
+          <a:lstStyle/>
+          <a:p>
+            <a:r>
+              <a:rPr lang="en-US" sz="2800" b="1" dirty="0" smtClean="0"/>
+              <a:t>Graph Distribution</a:t>
+            </a:r>
+            <a:endParaRPr lang="en-US" sz="2800" b="1" dirty="0"/>
+          </a:p>
+        </p:txBody>
+      </p:sp>
+    </p:spTree>
+  </p:cSld>
+  <p:clrMapOvr>
+    <a:masterClrMapping/>
+  </p:clrMapOvr>
+</p:sld>
+</file>
+
+<file path=ppt/slides/slide2.xml><?xml version="1.0" encoding="utf-8"?>
+<p:sld xmlns:a="http://schemas.openxmlformats.org/drawingml/2006/main" xmlns:r="http://schemas.openxmlformats.org/officeDocument/2006/relationships" xmlns:p="http://schemas.openxmlformats.org/presentationml/2006/main">
+  <p:cSld>
+    <p:spTree>
+      <p:nvGrpSpPr>
+        <p:cNvPr id="1" name=""/>
+        <p:cNvGrpSpPr/>
+        <p:nvPr/>
+      </p:nvGrpSpPr>
+      <p:grpSpPr>
+        <a:xfrm>
+          <a:off x="0" y="0"/>
+          <a:ext cx="0" cy="0"/>
+          <a:chOff x="0" y="0"/>
+          <a:chExt cx="0" cy="0"/>
+        </a:xfrm>
+      </p:grpSpPr>
+      <p:sp>
+        <p:nvSpPr>
+          <p:cNvPr id="4" name="Rounded Rectangle 3"/>
+          <p:cNvSpPr/>
+          <p:nvPr/>
+        </p:nvSpPr>
+        <p:spPr>
+          <a:xfrm>
+            <a:off x="1340038" y="1807029"/>
+            <a:ext cx="1371600" cy="1219200"/>
+          </a:xfrm>
+          <a:prstGeom prst="roundRect">
+            <a:avLst/>
+          </a:prstGeom>
+          <a:solidFill>
+            <a:schemeClr val="bg2"/>
+          </a:solidFill>
+          <a:ln w="38100">
+            <a:solidFill>
+              <a:schemeClr val="tx1"/>
+            </a:solidFill>
+          </a:ln>
+          <a:effectLst>
+            <a:outerShdw blurRad="50800" dist="38100" dir="2700000" algn="tl" rotWithShape="0">
+              <a:prstClr val="black">
+                <a:alpha val="40000"/>
+              </a:prstClr>
+            </a:outerShdw>
+          </a:effectLst>
+        </p:spPr>
+        <p:style>
+          <a:lnRef idx="2">
+            <a:schemeClr val="accent1">
+              <a:shade val="50000"/>
+            </a:schemeClr>
+          </a:lnRef>
+          <a:fillRef idx="1">
+            <a:schemeClr val="accent1"/>
+          </a:fillRef>
+          <a:effectRef idx="0">
+            <a:schemeClr val="accent1"/>
+          </a:effectRef>
+          <a:fontRef idx="minor">
+            <a:schemeClr val="lt1"/>
+          </a:fontRef>
+        </p:style>
+        <p:txBody>
+          <a:bodyPr rtlCol="0" anchor="ctr"/>
+          <a:lstStyle/>
+          <a:p>
+            <a:pPr algn="ctr"/>
+            <a:r>
+              <a:rPr lang="en-US" b="1" dirty="0" smtClean="0">
+                <a:solidFill>
+                  <a:schemeClr val="tx1"/>
+                </a:solidFill>
+              </a:rPr>
+              <a:t>IDE on Desktop</a:t>
+            </a:r>
+            <a:endParaRPr lang="en-US" b="1" dirty="0">
+              <a:solidFill>
+                <a:schemeClr val="tx1"/>
+              </a:solidFill>
+            </a:endParaRPr>
+          </a:p>
+        </p:txBody>
+      </p:sp>
+      <p:sp>
+        <p:nvSpPr>
+          <p:cNvPr id="5" name="Rectangle 4"/>
+          <p:cNvSpPr/>
+          <p:nvPr/>
+        </p:nvSpPr>
+        <p:spPr>
+          <a:xfrm>
+            <a:off x="1629174" y="2890745"/>
+            <a:ext cx="811441" cy="276999"/>
+          </a:xfrm>
+          <a:prstGeom prst="rect">
+            <a:avLst/>
+          </a:prstGeom>
+          <a:solidFill>
+            <a:srgbClr val="FFFFCC"/>
+          </a:solidFill>
+          <a:ln>
+            <a:solidFill>
+              <a:schemeClr val="tx1"/>
+            </a:solidFill>
+          </a:ln>
+          <a:effectLst>
+            <a:outerShdw blurRad="50800" dist="38100" dir="2700000" algn="tl" rotWithShape="0">
+              <a:prstClr val="black">
+                <a:alpha val="40000"/>
+              </a:prstClr>
+            </a:outerShdw>
+          </a:effectLst>
+        </p:spPr>
+        <p:txBody>
+          <a:bodyPr wrap="none">
+            <a:spAutoFit/>
+          </a:bodyPr>
+          <a:lstStyle/>
+          <a:p>
+            <a:r>
+              <a:rPr lang="en-US" sz="1200" dirty="0" smtClean="0"/>
+              <a:t>Hoop.java</a:t>
+            </a:r>
+            <a:endParaRPr lang="en-US" sz="1200" dirty="0"/>
+          </a:p>
+        </p:txBody>
+      </p:sp>
+      <p:sp>
+        <p:nvSpPr>
+          <p:cNvPr id="6" name="Rounded Rectangle 5"/>
+          <p:cNvSpPr/>
+          <p:nvPr/>
+        </p:nvSpPr>
+        <p:spPr>
+          <a:xfrm>
+            <a:off x="4464238" y="1807030"/>
+            <a:ext cx="1371600" cy="1219200"/>
+          </a:xfrm>
+          <a:prstGeom prst="roundRect">
+            <a:avLst/>
+          </a:prstGeom>
+          <a:solidFill>
+            <a:schemeClr val="bg2"/>
+          </a:solidFill>
+          <a:ln w="38100">
+            <a:solidFill>
+              <a:schemeClr val="tx1"/>
+            </a:solidFill>
+          </a:ln>
+          <a:effectLst>
+            <a:outerShdw blurRad="50800" dist="38100" dir="2700000" algn="tl" rotWithShape="0">
+              <a:prstClr val="black">
+                <a:alpha val="40000"/>
+              </a:prstClr>
+            </a:outerShdw>
+          </a:effectLst>
+        </p:spPr>
+        <p:style>
+          <a:lnRef idx="2">
+            <a:schemeClr val="accent1">
+              <a:shade val="50000"/>
+            </a:schemeClr>
+          </a:lnRef>
+          <a:fillRef idx="1">
+            <a:schemeClr val="accent1"/>
+          </a:fillRef>
+          <a:effectRef idx="0">
+            <a:schemeClr val="accent1"/>
+          </a:effectRef>
+          <a:fontRef idx="minor">
+            <a:schemeClr val="lt1"/>
+          </a:fontRef>
+        </p:style>
+        <p:txBody>
+          <a:bodyPr rtlCol="0" anchor="ctr"/>
+          <a:lstStyle/>
+          <a:p>
+            <a:pPr algn="ctr"/>
+            <a:r>
+              <a:rPr lang="en-US" b="1" dirty="0" smtClean="0">
+                <a:solidFill>
+                  <a:schemeClr val="tx1"/>
+                </a:solidFill>
+              </a:rPr>
+              <a:t>Broker on Cluster Login Node</a:t>
+            </a:r>
+            <a:endParaRPr lang="en-US" b="1" dirty="0">
+              <a:solidFill>
+                <a:schemeClr val="tx1"/>
+              </a:solidFill>
+            </a:endParaRPr>
+          </a:p>
+        </p:txBody>
+      </p:sp>
+      <p:sp>
+        <p:nvSpPr>
+          <p:cNvPr id="8" name="Rectangle 7"/>
+          <p:cNvSpPr/>
+          <p:nvPr/>
+        </p:nvSpPr>
+        <p:spPr>
+          <a:xfrm>
+            <a:off x="4288916" y="2921588"/>
+            <a:ext cx="1739130" cy="276999"/>
+          </a:xfrm>
+          <a:prstGeom prst="rect">
+            <a:avLst/>
+          </a:prstGeom>
+          <a:solidFill>
+            <a:srgbClr val="FFFFCC"/>
+          </a:solidFill>
+          <a:ln>
+            <a:solidFill>
+              <a:schemeClr val="tx1"/>
+            </a:solidFill>
+          </a:ln>
+          <a:effectLst>
+            <a:outerShdw blurRad="50800" dist="38100" dir="2700000" algn="tl" rotWithShape="0">
+              <a:prstClr val="black">
+                <a:alpha val="40000"/>
+              </a:prstClr>
+            </a:outerShdw>
+          </a:effectLst>
+        </p:spPr>
+        <p:txBody>
+          <a:bodyPr wrap="none">
+            <a:spAutoFit/>
+          </a:bodyPr>
+          <a:lstStyle/>
+          <a:p>
+            <a:r>
+              <a:rPr lang="en-US" sz="1200" dirty="0" smtClean="0"/>
+              <a:t>Hoop.HadoopBroker.java</a:t>
+            </a:r>
+            <a:endParaRPr lang="en-US" sz="1200" dirty="0"/>
+          </a:p>
+        </p:txBody>
+      </p:sp>
+      <p:cxnSp>
+        <p:nvCxnSpPr>
+          <p:cNvPr id="9" name="Straight Arrow Connector 8"/>
+          <p:cNvCxnSpPr>
+            <a:stCxn id="4" idx="3"/>
+            <a:endCxn id="6" idx="1"/>
+          </p:cNvCxnSpPr>
+          <p:nvPr/>
+        </p:nvCxnSpPr>
+        <p:spPr>
+          <a:xfrm>
+            <a:off x="2711638" y="2416629"/>
+            <a:ext cx="1752600" cy="1"/>
+          </a:xfrm>
+          <a:prstGeom prst="straightConnector1">
+            <a:avLst/>
+          </a:prstGeom>
+          <a:ln w="38100">
+            <a:solidFill>
+              <a:schemeClr val="tx1"/>
+            </a:solidFill>
+            <a:tailEnd type="triangle" w="lg" len="med"/>
+          </a:ln>
+        </p:spPr>
+        <p:style>
+          <a:lnRef idx="1">
+            <a:schemeClr val="accent1"/>
+          </a:lnRef>
+          <a:fillRef idx="0">
+            <a:schemeClr val="accent1"/>
+          </a:fillRef>
+          <a:effectRef idx="0">
+            <a:schemeClr val="accent1"/>
+          </a:effectRef>
+          <a:fontRef idx="minor">
+            <a:schemeClr val="tx1"/>
+          </a:fontRef>
+        </p:style>
+      </p:cxnSp>
+      <p:sp>
+        <p:nvSpPr>
+          <p:cNvPr id="12" name="Rounded Rectangle 11"/>
+          <p:cNvSpPr/>
+          <p:nvPr/>
+        </p:nvSpPr>
+        <p:spPr>
+          <a:xfrm>
+            <a:off x="2140138" y="4613730"/>
+            <a:ext cx="1371600" cy="1219200"/>
+          </a:xfrm>
+          <a:prstGeom prst="roundRect">
+            <a:avLst/>
+          </a:prstGeom>
+          <a:solidFill>
+            <a:schemeClr val="bg2"/>
+          </a:solidFill>
+          <a:ln w="38100">
+            <a:solidFill>
+              <a:schemeClr val="tx1"/>
+            </a:solidFill>
+          </a:ln>
+          <a:effectLst>
+            <a:outerShdw blurRad="50800" dist="38100" dir="2700000" algn="tl" rotWithShape="0">
+              <a:prstClr val="black">
+                <a:alpha val="40000"/>
+              </a:prstClr>
+            </a:outerShdw>
+          </a:effectLst>
+        </p:spPr>
+        <p:style>
+          <a:lnRef idx="2">
+            <a:schemeClr val="accent1">
+              <a:shade val="50000"/>
+            </a:schemeClr>
+          </a:lnRef>
+          <a:fillRef idx="1">
+            <a:schemeClr val="accent1"/>
+          </a:fillRef>
+          <a:effectRef idx="0">
+            <a:schemeClr val="accent1"/>
+          </a:effectRef>
+          <a:fontRef idx="minor">
+            <a:schemeClr val="lt1"/>
+          </a:fontRef>
+        </p:style>
+        <p:txBody>
+          <a:bodyPr rtlCol="0" anchor="ctr"/>
+          <a:lstStyle/>
+          <a:p>
+            <a:pPr algn="ctr"/>
+            <a:r>
+              <a:rPr lang="en-US" b="1" dirty="0" smtClean="0">
+                <a:solidFill>
+                  <a:schemeClr val="tx1"/>
+                </a:solidFill>
+              </a:rPr>
+              <a:t>Cluster  Node</a:t>
+            </a:r>
+            <a:endParaRPr lang="en-US" b="1" dirty="0">
+              <a:solidFill>
+                <a:schemeClr val="tx1"/>
+              </a:solidFill>
+            </a:endParaRPr>
+          </a:p>
+        </p:txBody>
+      </p:sp>
+      <p:cxnSp>
+        <p:nvCxnSpPr>
+          <p:cNvPr id="13" name="Straight Arrow Connector 12"/>
+          <p:cNvCxnSpPr>
+            <a:stCxn id="8" idx="2"/>
+            <a:endCxn id="12" idx="0"/>
+          </p:cNvCxnSpPr>
+          <p:nvPr/>
+        </p:nvCxnSpPr>
+        <p:spPr>
+          <a:xfrm flipH="1">
+            <a:off x="2825938" y="3198587"/>
+            <a:ext cx="2332543" cy="1415143"/>
+          </a:xfrm>
+          <a:prstGeom prst="straightConnector1">
+            <a:avLst/>
+          </a:prstGeom>
+          <a:ln w="38100">
+            <a:solidFill>
+              <a:schemeClr val="tx1"/>
+            </a:solidFill>
+            <a:tailEnd type="triangle" w="lg" len="med"/>
+          </a:ln>
+        </p:spPr>
+        <p:style>
+          <a:lnRef idx="1">
+            <a:schemeClr val="accent1"/>
+          </a:lnRef>
+          <a:fillRef idx="0">
+            <a:schemeClr val="accent1"/>
+          </a:fillRef>
+          <a:effectRef idx="0">
+            <a:schemeClr val="accent1"/>
+          </a:effectRef>
+          <a:fontRef idx="minor">
+            <a:schemeClr val="tx1"/>
+          </a:fontRef>
+        </p:style>
+      </p:cxnSp>
+      <p:sp>
+        <p:nvSpPr>
+          <p:cNvPr id="16" name="Rounded Rectangle 15"/>
+          <p:cNvSpPr/>
+          <p:nvPr/>
+        </p:nvSpPr>
+        <p:spPr>
+          <a:xfrm>
+            <a:off x="4413438" y="4601030"/>
+            <a:ext cx="1371600" cy="1219200"/>
+          </a:xfrm>
+          <a:prstGeom prst="roundRect">
+            <a:avLst/>
+          </a:prstGeom>
+          <a:solidFill>
+            <a:schemeClr val="bg2"/>
+          </a:solidFill>
+          <a:ln w="38100">
+            <a:solidFill>
+              <a:schemeClr val="tx1"/>
+            </a:solidFill>
+          </a:ln>
+          <a:effectLst>
+            <a:outerShdw blurRad="50800" dist="38100" dir="2700000" algn="tl" rotWithShape="0">
+              <a:prstClr val="black">
+                <a:alpha val="40000"/>
+              </a:prstClr>
+            </a:outerShdw>
+          </a:effectLst>
+        </p:spPr>
+        <p:style>
+          <a:lnRef idx="2">
+            <a:schemeClr val="accent1">
+              <a:shade val="50000"/>
+            </a:schemeClr>
+          </a:lnRef>
+          <a:fillRef idx="1">
+            <a:schemeClr val="accent1"/>
+          </a:fillRef>
+          <a:effectRef idx="0">
+            <a:schemeClr val="accent1"/>
+          </a:effectRef>
+          <a:fontRef idx="minor">
+            <a:schemeClr val="lt1"/>
+          </a:fontRef>
+        </p:style>
+        <p:txBody>
+          <a:bodyPr rtlCol="0" anchor="ctr"/>
+          <a:lstStyle/>
+          <a:p>
+            <a:pPr algn="ctr"/>
+            <a:r>
+              <a:rPr lang="en-US" b="1" dirty="0" smtClean="0">
+                <a:solidFill>
+                  <a:schemeClr val="tx1"/>
+                </a:solidFill>
+              </a:rPr>
+              <a:t>Cluster  Node</a:t>
+            </a:r>
+            <a:endParaRPr lang="en-US" b="1" dirty="0">
+              <a:solidFill>
+                <a:schemeClr val="tx1"/>
+              </a:solidFill>
+            </a:endParaRPr>
+          </a:p>
+        </p:txBody>
+      </p:sp>
+      <p:sp>
+        <p:nvSpPr>
+          <p:cNvPr id="17" name="Rounded Rectangle 16"/>
+          <p:cNvSpPr/>
+          <p:nvPr/>
+        </p:nvSpPr>
+        <p:spPr>
+          <a:xfrm>
+            <a:off x="6521638" y="4588330"/>
+            <a:ext cx="1371600" cy="1219200"/>
+          </a:xfrm>
+          <a:prstGeom prst="roundRect">
+            <a:avLst/>
+          </a:prstGeom>
+          <a:solidFill>
+            <a:schemeClr val="bg2"/>
+          </a:solidFill>
+          <a:ln w="38100">
+            <a:solidFill>
+              <a:schemeClr val="tx1"/>
+            </a:solidFill>
+          </a:ln>
+          <a:effectLst>
+            <a:outerShdw blurRad="50800" dist="38100" dir="2700000" algn="tl" rotWithShape="0">
+              <a:prstClr val="black">
+                <a:alpha val="40000"/>
+              </a:prstClr>
+            </a:outerShdw>
+          </a:effectLst>
+        </p:spPr>
+        <p:style>
+          <a:lnRef idx="2">
+            <a:schemeClr val="accent1">
+              <a:shade val="50000"/>
+            </a:schemeClr>
+          </a:lnRef>
+          <a:fillRef idx="1">
+            <a:schemeClr val="accent1"/>
+          </a:fillRef>
+          <a:effectRef idx="0">
+            <a:schemeClr val="accent1"/>
+          </a:effectRef>
+          <a:fontRef idx="minor">
+            <a:schemeClr val="lt1"/>
+          </a:fontRef>
+        </p:style>
+        <p:txBody>
+          <a:bodyPr rtlCol="0" anchor="ctr"/>
+          <a:lstStyle/>
+          <a:p>
+            <a:pPr algn="ctr"/>
+            <a:r>
+              <a:rPr lang="en-US" b="1" dirty="0" smtClean="0">
+                <a:solidFill>
+                  <a:schemeClr val="tx1"/>
+                </a:solidFill>
+              </a:rPr>
+              <a:t>Cluster  Node</a:t>
+            </a:r>
+            <a:endParaRPr lang="en-US" b="1" dirty="0">
+              <a:solidFill>
+                <a:schemeClr val="tx1"/>
+              </a:solidFill>
+            </a:endParaRPr>
+          </a:p>
+        </p:txBody>
+      </p:sp>
+      <p:cxnSp>
+        <p:nvCxnSpPr>
+          <p:cNvPr id="18" name="Straight Arrow Connector 17"/>
+          <p:cNvCxnSpPr>
+            <a:stCxn id="8" idx="2"/>
+            <a:endCxn id="16" idx="0"/>
+          </p:cNvCxnSpPr>
+          <p:nvPr/>
+        </p:nvCxnSpPr>
+        <p:spPr>
+          <a:xfrm flipH="1">
+            <a:off x="5099238" y="3198587"/>
+            <a:ext cx="59243" cy="1402443"/>
+          </a:xfrm>
+          <a:prstGeom prst="straightConnector1">
+            <a:avLst/>
+          </a:prstGeom>
+          <a:ln w="38100">
+            <a:solidFill>
+              <a:schemeClr val="tx1"/>
+            </a:solidFill>
+            <a:tailEnd type="triangle" w="lg" len="med"/>
+          </a:ln>
+        </p:spPr>
+        <p:style>
+          <a:lnRef idx="1">
+            <a:schemeClr val="accent1"/>
+          </a:lnRef>
+          <a:fillRef idx="0">
+            <a:schemeClr val="accent1"/>
+          </a:fillRef>
+          <a:effectRef idx="0">
+            <a:schemeClr val="accent1"/>
+          </a:effectRef>
+          <a:fontRef idx="minor">
+            <a:schemeClr val="tx1"/>
+          </a:fontRef>
+        </p:style>
+      </p:cxnSp>
+      <p:cxnSp>
+        <p:nvCxnSpPr>
+          <p:cNvPr id="21" name="Straight Arrow Connector 20"/>
+          <p:cNvCxnSpPr>
+            <a:stCxn id="8" idx="2"/>
+            <a:endCxn id="17" idx="0"/>
+          </p:cNvCxnSpPr>
+          <p:nvPr/>
+        </p:nvCxnSpPr>
+        <p:spPr>
+          <a:xfrm>
+            <a:off x="5158481" y="3198587"/>
+            <a:ext cx="2048957" cy="1389743"/>
+          </a:xfrm>
+          <a:prstGeom prst="straightConnector1">
+            <a:avLst/>
+          </a:prstGeom>
+          <a:ln w="38100">
+            <a:solidFill>
+              <a:schemeClr val="tx1"/>
+            </a:solidFill>
+            <a:tailEnd type="triangle" w="lg" len="med"/>
+          </a:ln>
+        </p:spPr>
+        <p:style>
+          <a:lnRef idx="1">
+            <a:schemeClr val="accent1"/>
+          </a:lnRef>
+          <a:fillRef idx="0">
+            <a:schemeClr val="accent1"/>
+          </a:fillRef>
+          <a:effectRef idx="0">
+            <a:schemeClr val="accent1"/>
+          </a:effectRef>
+          <a:fontRef idx="minor">
+            <a:schemeClr val="tx1"/>
+          </a:fontRef>
+        </p:style>
+      </p:cxnSp>
+      <p:sp>
+        <p:nvSpPr>
+          <p:cNvPr id="40" name="Oval 39"/>
+          <p:cNvSpPr/>
+          <p:nvPr/>
+        </p:nvSpPr>
+        <p:spPr>
+          <a:xfrm>
+            <a:off x="141514" y="141515"/>
+            <a:ext cx="506185" cy="506185"/>
+          </a:xfrm>
+          <a:prstGeom prst="ellipse">
+            <a:avLst/>
+          </a:prstGeom>
+          <a:solidFill>
+            <a:schemeClr val="bg1"/>
+          </a:solidFill>
+          <a:ln>
+            <a:solidFill>
+              <a:schemeClr val="tx1"/>
+            </a:solidFill>
+          </a:ln>
+          <a:effectLst>
+            <a:outerShdw blurRad="50800" dist="38100" dir="2700000" algn="tl" rotWithShape="0">
+              <a:prstClr val="black">
+                <a:alpha val="40000"/>
+              </a:prstClr>
+            </a:outerShdw>
+          </a:effectLst>
+        </p:spPr>
+        <p:style>
+          <a:lnRef idx="2">
+            <a:schemeClr val="accent1">
+              <a:shade val="50000"/>
+            </a:schemeClr>
+          </a:lnRef>
+          <a:fillRef idx="1">
+            <a:schemeClr val="accent1"/>
+          </a:fillRef>
+          <a:effectRef idx="0">
+            <a:schemeClr val="accent1"/>
+          </a:effectRef>
+          <a:fontRef idx="minor">
+            <a:schemeClr val="lt1"/>
+          </a:fontRef>
+        </p:style>
+        <p:txBody>
+          <a:bodyPr rtlCol="0" anchor="ctr"/>
+          <a:lstStyle/>
+          <a:p>
+            <a:pPr algn="ctr"/>
+            <a:r>
+              <a:rPr lang="en-US" sz="3200" b="1" dirty="0" smtClean="0">
+                <a:solidFill>
+                  <a:schemeClr val="tx1"/>
+                </a:solidFill>
+              </a:rPr>
+              <a:t>1</a:t>
+            </a:r>
+            <a:endParaRPr lang="en-US" sz="3200" b="1" dirty="0">
+              <a:solidFill>
+                <a:schemeClr val="tx1"/>
+              </a:solidFill>
+            </a:endParaRPr>
+          </a:p>
+        </p:txBody>
+      </p:sp>
+      <p:sp>
+        <p:nvSpPr>
+          <p:cNvPr id="41" name="TextBox 40"/>
+          <p:cNvSpPr txBox="1"/>
+          <p:nvPr/>
+        </p:nvSpPr>
+        <p:spPr>
+          <a:xfrm>
+            <a:off x="723900" y="152400"/>
+            <a:ext cx="2955553" cy="523220"/>
+          </a:xfrm>
+          <a:prstGeom prst="rect">
+            <a:avLst/>
+          </a:prstGeom>
+          <a:noFill/>
+        </p:spPr>
+        <p:txBody>
+          <a:bodyPr wrap="none" rtlCol="0">
+            <a:spAutoFit/>
+          </a:bodyPr>
+          <a:lstStyle/>
+          <a:p>
+            <a:r>
+              <a:rPr lang="en-US" sz="2800" b="1" dirty="0" smtClean="0"/>
+              <a:t>Graph Distribution</a:t>
+            </a:r>
+            <a:endParaRPr lang="en-US" sz="2800" b="1" dirty="0"/>
+          </a:p>
+        </p:txBody>
+      </p:sp>
+    </p:spTree>
+  </p:cSld>
+  <p:clrMapOvr>
+    <a:masterClrMapping/>
+  </p:clrMapOvr>
+</p:sld>
+</file>
+
+<file path=ppt/slides/slide3.xml><?xml version="1.0" encoding="utf-8"?>
+<p:sld xmlns:a="http://schemas.openxmlformats.org/drawingml/2006/main" xmlns:r="http://schemas.openxmlformats.org/officeDocument/2006/relationships" xmlns:p="http://schemas.openxmlformats.org/presentationml/2006/main">
+  <p:cSld>
+    <p:spTree>
+      <p:nvGrpSpPr>
+        <p:cNvPr id="1" name=""/>
+        <p:cNvGrpSpPr/>
+        <p:nvPr/>
+      </p:nvGrpSpPr>
+      <p:grpSpPr>
+        <a:xfrm>
+          <a:off x="0" y="0"/>
+          <a:ext cx="0" cy="0"/>
+          <a:chOff x="0" y="0"/>
+          <a:chExt cx="0" cy="0"/>
+        </a:xfrm>
+      </p:grpSpPr>
+      <p:grpSp>
+        <p:nvGrpSpPr>
+          <p:cNvPr id="64" name="Group 63"/>
+          <p:cNvGrpSpPr/>
+          <p:nvPr/>
+        </p:nvGrpSpPr>
+        <p:grpSpPr>
+          <a:xfrm>
+            <a:off x="392981" y="1393372"/>
+            <a:ext cx="1371600" cy="1360715"/>
+            <a:chOff x="1340038" y="1807029"/>
+            <a:chExt cx="1371600" cy="1360715"/>
+          </a:xfrm>
+        </p:grpSpPr>
+        <p:sp>
+          <p:nvSpPr>
+            <p:cNvPr id="4" name="Rounded Rectangle 3"/>
+            <p:cNvSpPr/>
+            <p:nvPr/>
+          </p:nvSpPr>
+          <p:spPr>
+            <a:xfrm>
+              <a:off x="1340038" y="1807029"/>
+              <a:ext cx="1371600" cy="1219200"/>
+            </a:xfrm>
+            <a:prstGeom prst="roundRect">
+              <a:avLst/>
+            </a:prstGeom>
+            <a:solidFill>
+              <a:schemeClr val="bg2"/>
+            </a:solidFill>
+            <a:ln w="38100">
+              <a:solidFill>
+                <a:schemeClr val="tx1"/>
+              </a:solidFill>
+            </a:ln>
+            <a:effectLst>
+              <a:outerShdw blurRad="50800" dist="38100" dir="2700000" algn="tl" rotWithShape="0">
+                <a:prstClr val="black">
+                  <a:alpha val="40000"/>
+                </a:prstClr>
+              </a:outerShdw>
+            </a:effectLst>
+          </p:spPr>
+          <p:style>
+            <a:lnRef idx="2">
+              <a:schemeClr val="accent1">
+                <a:shade val="50000"/>
+              </a:schemeClr>
+            </a:lnRef>
+            <a:fillRef idx="1">
+              <a:schemeClr val="accent1"/>
+            </a:fillRef>
+            <a:effectRef idx="0">
+              <a:schemeClr val="accent1"/>
+            </a:effectRef>
+            <a:fontRef idx="minor">
+              <a:schemeClr val="lt1"/>
+            </a:fontRef>
+          </p:style>
+          <p:txBody>
+            <a:bodyPr rtlCol="0" anchor="ctr"/>
+            <a:lstStyle/>
+            <a:p>
+              <a:pPr algn="ctr"/>
+              <a:r>
+                <a:rPr lang="en-US" b="1" dirty="0" smtClean="0">
+                  <a:solidFill>
+                    <a:schemeClr val="tx1"/>
+                  </a:solidFill>
+                </a:rPr>
+                <a:t>IDE on Desktop</a:t>
+              </a:r>
+              <a:endParaRPr lang="en-US" b="1" dirty="0">
+                <a:solidFill>
+                  <a:schemeClr val="tx1"/>
+                </a:solidFill>
+              </a:endParaRPr>
+            </a:p>
+          </p:txBody>
+        </p:sp>
+        <p:sp>
+          <p:nvSpPr>
+            <p:cNvPr id="5" name="Rectangle 4"/>
+            <p:cNvSpPr/>
+            <p:nvPr/>
+          </p:nvSpPr>
+          <p:spPr>
+            <a:xfrm>
+              <a:off x="1629174" y="2890745"/>
+              <a:ext cx="811441" cy="276999"/>
+            </a:xfrm>
+            <a:prstGeom prst="rect">
+              <a:avLst/>
+            </a:prstGeom>
+            <a:solidFill>
+              <a:srgbClr val="FFFFCC"/>
+            </a:solidFill>
+            <a:ln>
+              <a:solidFill>
+                <a:schemeClr val="tx1"/>
+              </a:solidFill>
+            </a:ln>
+            <a:effectLst>
+              <a:outerShdw blurRad="50800" dist="38100" dir="2700000" algn="tl" rotWithShape="0">
+                <a:prstClr val="black">
+                  <a:alpha val="40000"/>
+                </a:prstClr>
+              </a:outerShdw>
+            </a:effectLst>
+          </p:spPr>
+          <p:txBody>
+            <a:bodyPr wrap="none">
+              <a:spAutoFit/>
+            </a:bodyPr>
+            <a:lstStyle/>
+            <a:p>
+              <a:r>
+                <a:rPr lang="en-US" sz="1200" dirty="0" smtClean="0"/>
+                <a:t>Hoop.java</a:t>
+              </a:r>
+              <a:endParaRPr lang="en-US" sz="1200" dirty="0"/>
+            </a:p>
+          </p:txBody>
+        </p:sp>
+      </p:grpSp>
+      <p:grpSp>
+        <p:nvGrpSpPr>
+          <p:cNvPr id="65" name="Group 64"/>
+          <p:cNvGrpSpPr/>
+          <p:nvPr/>
+        </p:nvGrpSpPr>
+        <p:grpSpPr>
+          <a:xfrm>
+            <a:off x="4288916" y="1807030"/>
+            <a:ext cx="1739130" cy="1391557"/>
+            <a:chOff x="4288916" y="1807030"/>
+            <a:chExt cx="1739130" cy="1391557"/>
+          </a:xfrm>
+        </p:grpSpPr>
+        <p:sp>
+          <p:nvSpPr>
+            <p:cNvPr id="6" name="Rounded Rectangle 5"/>
+            <p:cNvSpPr/>
+            <p:nvPr/>
+          </p:nvSpPr>
+          <p:spPr>
+            <a:xfrm>
+              <a:off x="4464238" y="1807030"/>
+              <a:ext cx="1371600" cy="1219200"/>
+            </a:xfrm>
+            <a:prstGeom prst="roundRect">
+              <a:avLst/>
+            </a:prstGeom>
+            <a:solidFill>
+              <a:schemeClr val="bg2"/>
+            </a:solidFill>
+            <a:ln w="38100">
+              <a:solidFill>
+                <a:schemeClr val="tx1"/>
+              </a:solidFill>
+            </a:ln>
+            <a:effectLst>
+              <a:outerShdw blurRad="50800" dist="38100" dir="2700000" algn="tl" rotWithShape="0">
+                <a:prstClr val="black">
+                  <a:alpha val="40000"/>
+                </a:prstClr>
+              </a:outerShdw>
+            </a:effectLst>
+          </p:spPr>
+          <p:style>
+            <a:lnRef idx="2">
+              <a:schemeClr val="accent1">
+                <a:shade val="50000"/>
+              </a:schemeClr>
+            </a:lnRef>
+            <a:fillRef idx="1">
+              <a:schemeClr val="accent1"/>
+            </a:fillRef>
+            <a:effectRef idx="0">
+              <a:schemeClr val="accent1"/>
+            </a:effectRef>
+            <a:fontRef idx="minor">
+              <a:schemeClr val="lt1"/>
+            </a:fontRef>
+          </p:style>
+          <p:txBody>
+            <a:bodyPr rtlCol="0" anchor="ctr"/>
+            <a:lstStyle/>
+            <a:p>
+              <a:pPr algn="ctr"/>
+              <a:r>
+                <a:rPr lang="en-US" b="1" dirty="0" smtClean="0">
+                  <a:solidFill>
+                    <a:schemeClr val="tx1"/>
+                  </a:solidFill>
+                </a:rPr>
+                <a:t>Broker on Cluster Login Node</a:t>
+              </a:r>
+              <a:endParaRPr lang="en-US" b="1" dirty="0">
+                <a:solidFill>
+                  <a:schemeClr val="tx1"/>
+                </a:solidFill>
+              </a:endParaRPr>
+            </a:p>
+          </p:txBody>
+        </p:sp>
+        <p:sp>
+          <p:nvSpPr>
+            <p:cNvPr id="8" name="Rectangle 7"/>
+            <p:cNvSpPr/>
+            <p:nvPr/>
+          </p:nvSpPr>
+          <p:spPr>
+            <a:xfrm>
+              <a:off x="4288916" y="2921588"/>
+              <a:ext cx="1739130" cy="276999"/>
+            </a:xfrm>
+            <a:prstGeom prst="rect">
+              <a:avLst/>
+            </a:prstGeom>
+            <a:solidFill>
+              <a:srgbClr val="FFFFCC"/>
+            </a:solidFill>
+            <a:ln>
+              <a:solidFill>
+                <a:schemeClr val="tx1"/>
+              </a:solidFill>
+            </a:ln>
+            <a:effectLst>
+              <a:outerShdw blurRad="50800" dist="38100" dir="2700000" algn="tl" rotWithShape="0">
+                <a:prstClr val="black">
+                  <a:alpha val="40000"/>
+                </a:prstClr>
+              </a:outerShdw>
+            </a:effectLst>
+          </p:spPr>
+          <p:txBody>
+            <a:bodyPr wrap="none">
+              <a:spAutoFit/>
+            </a:bodyPr>
+            <a:lstStyle/>
+            <a:p>
+              <a:r>
+                <a:rPr lang="en-US" sz="1200" dirty="0" smtClean="0"/>
+                <a:t>Hoop.HadoopBroker.java</a:t>
+              </a:r>
+              <a:endParaRPr lang="en-US" sz="1200" dirty="0"/>
+            </a:p>
+          </p:txBody>
+        </p:sp>
+      </p:grpSp>
+      <p:cxnSp>
+        <p:nvCxnSpPr>
+          <p:cNvPr id="9" name="Straight Arrow Connector 8"/>
+          <p:cNvCxnSpPr>
+            <a:stCxn id="4" idx="3"/>
+            <a:endCxn id="6" idx="1"/>
+          </p:cNvCxnSpPr>
+          <p:nvPr/>
+        </p:nvCxnSpPr>
+        <p:spPr>
+          <a:xfrm>
+            <a:off x="1764581" y="2002972"/>
+            <a:ext cx="2699657" cy="413658"/>
+          </a:xfrm>
+          <a:prstGeom prst="straightConnector1">
+            <a:avLst/>
+          </a:prstGeom>
+          <a:ln w="38100">
+            <a:solidFill>
+              <a:schemeClr val="tx1"/>
+            </a:solidFill>
+            <a:tailEnd type="triangle" w="lg" len="med"/>
+          </a:ln>
+        </p:spPr>
+        <p:style>
+          <a:lnRef idx="1">
+            <a:schemeClr val="accent1"/>
+          </a:lnRef>
+          <a:fillRef idx="0">
+            <a:schemeClr val="accent1"/>
+          </a:fillRef>
+          <a:effectRef idx="0">
+            <a:schemeClr val="accent1"/>
+          </a:effectRef>
+          <a:fontRef idx="minor">
+            <a:schemeClr val="tx1"/>
+          </a:fontRef>
+        </p:style>
+      </p:cxnSp>
+      <p:sp>
+        <p:nvSpPr>
+          <p:cNvPr id="12" name="Rounded Rectangle 11"/>
+          <p:cNvSpPr/>
+          <p:nvPr/>
+        </p:nvSpPr>
+        <p:spPr>
+          <a:xfrm>
+            <a:off x="703224" y="5321302"/>
+            <a:ext cx="1371600" cy="1219200"/>
+          </a:xfrm>
+          <a:prstGeom prst="roundRect">
+            <a:avLst/>
+          </a:prstGeom>
+          <a:solidFill>
+            <a:schemeClr val="bg2"/>
+          </a:solidFill>
+          <a:ln w="38100">
+            <a:solidFill>
+              <a:schemeClr val="tx1"/>
+            </a:solidFill>
+          </a:ln>
+          <a:effectLst>
+            <a:outerShdw blurRad="50800" dist="38100" dir="2700000" algn="tl" rotWithShape="0">
+              <a:prstClr val="black">
+                <a:alpha val="40000"/>
+              </a:prstClr>
+            </a:outerShdw>
+          </a:effectLst>
+        </p:spPr>
+        <p:style>
+          <a:lnRef idx="2">
+            <a:schemeClr val="accent1">
+              <a:shade val="50000"/>
+            </a:schemeClr>
+          </a:lnRef>
+          <a:fillRef idx="1">
+            <a:schemeClr val="accent1"/>
+          </a:fillRef>
+          <a:effectRef idx="0">
+            <a:schemeClr val="accent1"/>
+          </a:effectRef>
+          <a:fontRef idx="minor">
+            <a:schemeClr val="lt1"/>
+          </a:fontRef>
+        </p:style>
+        <p:txBody>
+          <a:bodyPr rtlCol="0" anchor="ctr"/>
+          <a:lstStyle/>
+          <a:p>
+            <a:pPr algn="ctr"/>
+            <a:r>
+              <a:rPr lang="en-US" b="1" dirty="0" smtClean="0">
+                <a:solidFill>
+                  <a:schemeClr val="tx1"/>
+                </a:solidFill>
+              </a:rPr>
+              <a:t>Cluster  Node</a:t>
+            </a:r>
+            <a:endParaRPr lang="en-US" b="1" dirty="0">
+              <a:solidFill>
+                <a:schemeClr val="tx1"/>
+              </a:solidFill>
+            </a:endParaRPr>
+          </a:p>
+        </p:txBody>
+      </p:sp>
+      <p:cxnSp>
+        <p:nvCxnSpPr>
+          <p:cNvPr id="13" name="Straight Arrow Connector 12"/>
+          <p:cNvCxnSpPr>
+            <a:stCxn id="8" idx="2"/>
+            <a:endCxn id="12" idx="0"/>
+          </p:cNvCxnSpPr>
+          <p:nvPr/>
+        </p:nvCxnSpPr>
+        <p:spPr>
+          <a:xfrm flipH="1">
+            <a:off x="1389024" y="3198587"/>
+            <a:ext cx="3769457" cy="2122715"/>
+          </a:xfrm>
+          <a:prstGeom prst="straightConnector1">
+            <a:avLst/>
+          </a:prstGeom>
+          <a:ln w="38100">
+            <a:solidFill>
+              <a:schemeClr val="tx1"/>
+            </a:solidFill>
+            <a:tailEnd type="triangle" w="lg" len="med"/>
+          </a:ln>
+        </p:spPr>
+        <p:style>
+          <a:lnRef idx="1">
+            <a:schemeClr val="accent1"/>
+          </a:lnRef>
+          <a:fillRef idx="0">
+            <a:schemeClr val="accent1"/>
+          </a:fillRef>
+          <a:effectRef idx="0">
+            <a:schemeClr val="accent1"/>
+          </a:effectRef>
+          <a:fontRef idx="minor">
+            <a:schemeClr val="tx1"/>
+          </a:fontRef>
+        </p:style>
+      </p:cxnSp>
+      <p:sp>
+        <p:nvSpPr>
+          <p:cNvPr id="16" name="Rounded Rectangle 15"/>
+          <p:cNvSpPr/>
+          <p:nvPr/>
+        </p:nvSpPr>
+        <p:spPr>
+          <a:xfrm>
+            <a:off x="4446095" y="5395686"/>
+            <a:ext cx="1371600" cy="1219200"/>
+          </a:xfrm>
+          <a:prstGeom prst="roundRect">
+            <a:avLst/>
+          </a:prstGeom>
+          <a:solidFill>
+            <a:schemeClr val="bg2"/>
+          </a:solidFill>
+          <a:ln w="38100">
+            <a:solidFill>
+              <a:schemeClr val="tx1"/>
+            </a:solidFill>
+          </a:ln>
+          <a:effectLst>
+            <a:outerShdw blurRad="50800" dist="38100" dir="2700000" algn="tl" rotWithShape="0">
+              <a:prstClr val="black">
+                <a:alpha val="40000"/>
+              </a:prstClr>
+            </a:outerShdw>
+          </a:effectLst>
+        </p:spPr>
+        <p:style>
+          <a:lnRef idx="2">
+            <a:schemeClr val="accent1">
+              <a:shade val="50000"/>
+            </a:schemeClr>
+          </a:lnRef>
+          <a:fillRef idx="1">
+            <a:schemeClr val="accent1"/>
+          </a:fillRef>
+          <a:effectRef idx="0">
+            <a:schemeClr val="accent1"/>
+          </a:effectRef>
+          <a:fontRef idx="minor">
+            <a:schemeClr val="lt1"/>
+          </a:fontRef>
+        </p:style>
+        <p:txBody>
+          <a:bodyPr rtlCol="0" anchor="ctr"/>
+          <a:lstStyle/>
+          <a:p>
+            <a:pPr algn="ctr"/>
+            <a:r>
+              <a:rPr lang="en-US" b="1" dirty="0" smtClean="0">
+                <a:solidFill>
+                  <a:schemeClr val="tx1"/>
+                </a:solidFill>
+              </a:rPr>
+              <a:t>Cluster  Node</a:t>
+            </a:r>
+            <a:endParaRPr lang="en-US" b="1" dirty="0">
+              <a:solidFill>
+                <a:schemeClr val="tx1"/>
+              </a:solidFill>
+            </a:endParaRPr>
+          </a:p>
+        </p:txBody>
+      </p:sp>
+      <p:sp>
+        <p:nvSpPr>
+          <p:cNvPr id="17" name="Rounded Rectangle 16"/>
+          <p:cNvSpPr/>
+          <p:nvPr/>
+        </p:nvSpPr>
+        <p:spPr>
+          <a:xfrm>
+            <a:off x="7566667" y="5404759"/>
+            <a:ext cx="1371600" cy="1219200"/>
+          </a:xfrm>
+          <a:prstGeom prst="roundRect">
+            <a:avLst/>
+          </a:prstGeom>
+          <a:solidFill>
+            <a:schemeClr val="bg2"/>
+          </a:solidFill>
+          <a:ln w="38100">
+            <a:solidFill>
+              <a:schemeClr val="tx1"/>
+            </a:solidFill>
+          </a:ln>
+          <a:effectLst>
+            <a:outerShdw blurRad="50800" dist="38100" dir="2700000" algn="tl" rotWithShape="0">
+              <a:prstClr val="black">
+                <a:alpha val="40000"/>
+              </a:prstClr>
+            </a:outerShdw>
+          </a:effectLst>
+        </p:spPr>
+        <p:style>
+          <a:lnRef idx="2">
+            <a:schemeClr val="accent1">
+              <a:shade val="50000"/>
+            </a:schemeClr>
+          </a:lnRef>
+          <a:fillRef idx="1">
+            <a:schemeClr val="accent1"/>
+          </a:fillRef>
+          <a:effectRef idx="0">
+            <a:schemeClr val="accent1"/>
+          </a:effectRef>
+          <a:fontRef idx="minor">
+            <a:schemeClr val="lt1"/>
+          </a:fontRef>
+        </p:style>
+        <p:txBody>
+          <a:bodyPr rtlCol="0" anchor="ctr"/>
+          <a:lstStyle/>
+          <a:p>
+            <a:pPr algn="ctr"/>
+            <a:r>
+              <a:rPr lang="en-US" b="1" dirty="0" smtClean="0">
+                <a:solidFill>
+                  <a:schemeClr val="tx1"/>
+                </a:solidFill>
+              </a:rPr>
+              <a:t>Cluster  Node</a:t>
+            </a:r>
+            <a:endParaRPr lang="en-US" b="1" dirty="0">
+              <a:solidFill>
+                <a:schemeClr val="tx1"/>
+              </a:solidFill>
+            </a:endParaRPr>
+          </a:p>
+        </p:txBody>
+      </p:sp>
+      <p:cxnSp>
+        <p:nvCxnSpPr>
+          <p:cNvPr id="18" name="Straight Arrow Connector 17"/>
+          <p:cNvCxnSpPr>
+            <a:stCxn id="8" idx="2"/>
+            <a:endCxn id="16" idx="0"/>
+          </p:cNvCxnSpPr>
+          <p:nvPr/>
+        </p:nvCxnSpPr>
+        <p:spPr>
+          <a:xfrm flipH="1">
+            <a:off x="5131895" y="3198587"/>
+            <a:ext cx="26586" cy="2197099"/>
+          </a:xfrm>
+          <a:prstGeom prst="straightConnector1">
+            <a:avLst/>
+          </a:prstGeom>
+          <a:ln w="38100">
+            <a:solidFill>
+              <a:schemeClr val="tx1"/>
+            </a:solidFill>
+            <a:tailEnd type="triangle" w="lg" len="med"/>
+          </a:ln>
+        </p:spPr>
+        <p:style>
+          <a:lnRef idx="1">
+            <a:schemeClr val="accent1"/>
+          </a:lnRef>
+          <a:fillRef idx="0">
+            <a:schemeClr val="accent1"/>
+          </a:fillRef>
+          <a:effectRef idx="0">
+            <a:schemeClr val="accent1"/>
+          </a:effectRef>
+          <a:fontRef idx="minor">
+            <a:schemeClr val="tx1"/>
+          </a:fontRef>
+        </p:style>
+      </p:cxnSp>
+      <p:cxnSp>
+        <p:nvCxnSpPr>
+          <p:cNvPr id="21" name="Straight Arrow Connector 20"/>
+          <p:cNvCxnSpPr>
+            <a:stCxn id="8" idx="2"/>
+            <a:endCxn id="17" idx="0"/>
+          </p:cNvCxnSpPr>
+          <p:nvPr/>
+        </p:nvCxnSpPr>
+        <p:spPr>
+          <a:xfrm>
+            <a:off x="5158481" y="3198587"/>
+            <a:ext cx="3093986" cy="2206172"/>
+          </a:xfrm>
+          <a:prstGeom prst="straightConnector1">
+            <a:avLst/>
+          </a:prstGeom>
+          <a:ln w="38100">
+            <a:solidFill>
+              <a:schemeClr val="tx1"/>
+            </a:solidFill>
+            <a:tailEnd type="triangle" w="lg" len="med"/>
+          </a:ln>
+        </p:spPr>
+        <p:style>
+          <a:lnRef idx="1">
+            <a:schemeClr val="accent1"/>
+          </a:lnRef>
+          <a:fillRef idx="0">
+            <a:schemeClr val="accent1"/>
+          </a:fillRef>
+          <a:effectRef idx="0">
+            <a:schemeClr val="accent1"/>
+          </a:effectRef>
+          <a:fontRef idx="minor">
+            <a:schemeClr val="tx1"/>
+          </a:fontRef>
+        </p:style>
+      </p:cxnSp>
+      <p:sp>
+        <p:nvSpPr>
+          <p:cNvPr id="40" name="Oval 39"/>
+          <p:cNvSpPr/>
+          <p:nvPr/>
+        </p:nvSpPr>
+        <p:spPr>
+          <a:xfrm>
+            <a:off x="141514" y="141515"/>
+            <a:ext cx="506185" cy="506185"/>
+          </a:xfrm>
+          <a:prstGeom prst="ellipse">
+            <a:avLst/>
+          </a:prstGeom>
+          <a:solidFill>
+            <a:schemeClr val="bg1"/>
+          </a:solidFill>
+          <a:ln>
+            <a:solidFill>
+              <a:schemeClr val="tx1"/>
+            </a:solidFill>
+          </a:ln>
+          <a:effectLst>
+            <a:outerShdw blurRad="50800" dist="38100" dir="2700000" algn="tl" rotWithShape="0">
+              <a:prstClr val="black">
+                <a:alpha val="40000"/>
+              </a:prstClr>
+            </a:outerShdw>
+          </a:effectLst>
+        </p:spPr>
+        <p:style>
+          <a:lnRef idx="2">
+            <a:schemeClr val="accent1">
+              <a:shade val="50000"/>
+            </a:schemeClr>
+          </a:lnRef>
+          <a:fillRef idx="1">
+            <a:schemeClr val="accent1"/>
+          </a:fillRef>
+          <a:effectRef idx="0">
+            <a:schemeClr val="accent1"/>
+          </a:effectRef>
+          <a:fontRef idx="minor">
+            <a:schemeClr val="lt1"/>
+          </a:fontRef>
+        </p:style>
+        <p:txBody>
+          <a:bodyPr rtlCol="0" anchor="ctr"/>
+          <a:lstStyle/>
+          <a:p>
+            <a:pPr algn="ctr"/>
+            <a:r>
+              <a:rPr lang="en-US" sz="3200" b="1" dirty="0" smtClean="0">
+                <a:solidFill>
+                  <a:schemeClr val="tx1"/>
+                </a:solidFill>
+              </a:rPr>
+              <a:t>1</a:t>
+            </a:r>
+            <a:endParaRPr lang="en-US" sz="3200" b="1" dirty="0">
+              <a:solidFill>
+                <a:schemeClr val="tx1"/>
+              </a:solidFill>
+            </a:endParaRPr>
+          </a:p>
+        </p:txBody>
+      </p:sp>
+      <p:sp>
+        <p:nvSpPr>
+          <p:cNvPr id="41" name="TextBox 40"/>
+          <p:cNvSpPr txBox="1"/>
+          <p:nvPr/>
+        </p:nvSpPr>
+        <p:spPr>
+          <a:xfrm>
+            <a:off x="723900" y="152400"/>
+            <a:ext cx="5161156" cy="523220"/>
+          </a:xfrm>
+          <a:prstGeom prst="rect">
+            <a:avLst/>
+          </a:prstGeom>
+          <a:noFill/>
+        </p:spPr>
+        <p:txBody>
+          <a:bodyPr wrap="none" rtlCol="0">
+            <a:spAutoFit/>
+          </a:bodyPr>
+          <a:lstStyle/>
+          <a:p>
+            <a:r>
+              <a:rPr lang="en-US" sz="2800" b="1" dirty="0" smtClean="0"/>
+              <a:t>Graph Packaging and Distribution</a:t>
+            </a:r>
+            <a:endParaRPr lang="en-US" sz="2800" b="1" dirty="0"/>
+          </a:p>
+        </p:txBody>
+      </p:sp>
+      <p:grpSp>
+        <p:nvGrpSpPr>
+          <p:cNvPr id="39" name="Group 38"/>
+          <p:cNvGrpSpPr/>
+          <p:nvPr/>
+        </p:nvGrpSpPr>
+        <p:grpSpPr>
+          <a:xfrm>
+            <a:off x="3015343" y="1436914"/>
+            <a:ext cx="674913" cy="555172"/>
+            <a:chOff x="3276600" y="816428"/>
+            <a:chExt cx="674913" cy="555172"/>
+          </a:xfrm>
+        </p:grpSpPr>
+        <p:sp>
+          <p:nvSpPr>
+            <p:cNvPr id="26" name="Rectangle 25"/>
+            <p:cNvSpPr/>
+            <p:nvPr/>
+          </p:nvSpPr>
+          <p:spPr>
+            <a:xfrm>
+              <a:off x="3276600" y="957943"/>
+              <a:ext cx="250371" cy="217715"/>
+            </a:xfrm>
+            <a:prstGeom prst="rect">
+              <a:avLst/>
+            </a:prstGeom>
+            <a:solidFill>
+              <a:schemeClr val="bg2">
+                <a:lumMod val="75000"/>
+              </a:schemeClr>
+            </a:solidFill>
+            <a:ln>
+              <a:solidFill>
+                <a:schemeClr val="tx1"/>
+              </a:solidFill>
+            </a:ln>
+          </p:spPr>
+          <p:style>
+            <a:lnRef idx="2">
+              <a:schemeClr val="accent1">
+                <a:shade val="50000"/>
+              </a:schemeClr>
+            </a:lnRef>
+            <a:fillRef idx="1">
+              <a:schemeClr val="accent1"/>
+            </a:fillRef>
+            <a:effectRef idx="0">
+              <a:schemeClr val="accent1"/>
+            </a:effectRef>
+            <a:fontRef idx="minor">
+              <a:schemeClr val="lt1"/>
+            </a:fontRef>
+          </p:style>
+          <p:txBody>
+            <a:bodyPr rtlCol="0" anchor="ctr"/>
+            <a:lstStyle/>
+            <a:p>
+              <a:pPr algn="ctr"/>
+              <a:endParaRPr lang="en-US"/>
+            </a:p>
+          </p:txBody>
+        </p:sp>
+        <p:sp>
+          <p:nvSpPr>
+            <p:cNvPr id="27" name="Rectangle 26"/>
+            <p:cNvSpPr/>
+            <p:nvPr/>
+          </p:nvSpPr>
+          <p:spPr>
+            <a:xfrm>
+              <a:off x="3701142" y="816428"/>
+              <a:ext cx="250371" cy="217715"/>
+            </a:xfrm>
+            <a:prstGeom prst="rect">
+              <a:avLst/>
+            </a:prstGeom>
+            <a:solidFill>
+              <a:schemeClr val="bg2">
+                <a:lumMod val="75000"/>
+              </a:schemeClr>
+            </a:solidFill>
+            <a:ln>
+              <a:solidFill>
+                <a:schemeClr val="tx1"/>
+              </a:solidFill>
+            </a:ln>
+          </p:spPr>
+          <p:style>
+            <a:lnRef idx="2">
+              <a:schemeClr val="accent1">
+                <a:shade val="50000"/>
+              </a:schemeClr>
+            </a:lnRef>
+            <a:fillRef idx="1">
+              <a:schemeClr val="accent1"/>
+            </a:fillRef>
+            <a:effectRef idx="0">
+              <a:schemeClr val="accent1"/>
+            </a:effectRef>
+            <a:fontRef idx="minor">
+              <a:schemeClr val="lt1"/>
+            </a:fontRef>
+          </p:style>
+          <p:txBody>
+            <a:bodyPr rtlCol="0" anchor="ctr"/>
+            <a:lstStyle/>
+            <a:p>
+              <a:pPr algn="ctr"/>
+              <a:endParaRPr lang="en-US"/>
+            </a:p>
+          </p:txBody>
+        </p:sp>
+        <p:sp>
+          <p:nvSpPr>
+            <p:cNvPr id="28" name="Rectangle 27"/>
+            <p:cNvSpPr/>
+            <p:nvPr/>
+          </p:nvSpPr>
+          <p:spPr>
+            <a:xfrm>
+              <a:off x="3690256" y="1153885"/>
+              <a:ext cx="250371" cy="217715"/>
+            </a:xfrm>
+            <a:prstGeom prst="rect">
+              <a:avLst/>
+            </a:prstGeom>
+            <a:solidFill>
+              <a:schemeClr val="bg2">
+                <a:lumMod val="75000"/>
+              </a:schemeClr>
+            </a:solidFill>
+            <a:ln>
+              <a:solidFill>
+                <a:schemeClr val="tx1"/>
+              </a:solidFill>
+            </a:ln>
+          </p:spPr>
+          <p:style>
+            <a:lnRef idx="2">
+              <a:schemeClr val="accent1">
+                <a:shade val="50000"/>
+              </a:schemeClr>
+            </a:lnRef>
+            <a:fillRef idx="1">
+              <a:schemeClr val="accent1"/>
+            </a:fillRef>
+            <a:effectRef idx="0">
+              <a:schemeClr val="accent1"/>
+            </a:effectRef>
+            <a:fontRef idx="minor">
+              <a:schemeClr val="lt1"/>
+            </a:fontRef>
+          </p:style>
+          <p:txBody>
+            <a:bodyPr rtlCol="0" anchor="ctr"/>
+            <a:lstStyle/>
+            <a:p>
+              <a:pPr algn="ctr"/>
+              <a:endParaRPr lang="en-US"/>
+            </a:p>
+          </p:txBody>
+        </p:sp>
+        <p:cxnSp>
+          <p:nvCxnSpPr>
+            <p:cNvPr id="30" name="Straight Connector 29"/>
+            <p:cNvCxnSpPr>
+              <a:stCxn id="26" idx="3"/>
+              <a:endCxn id="27" idx="1"/>
+            </p:cNvCxnSpPr>
+            <p:nvPr/>
+          </p:nvCxnSpPr>
+          <p:spPr>
+            <a:xfrm flipV="1">
+              <a:off x="3526971" y="925286"/>
+              <a:ext cx="174171" cy="141515"/>
+            </a:xfrm>
+            <a:prstGeom prst="line">
+              <a:avLst/>
+            </a:prstGeom>
+            <a:ln w="25400">
+              <a:solidFill>
+                <a:schemeClr val="tx1"/>
+              </a:solidFill>
+            </a:ln>
+          </p:spPr>
+          <p:style>
+            <a:lnRef idx="1">
+              <a:schemeClr val="accent1"/>
+            </a:lnRef>
+            <a:fillRef idx="0">
+              <a:schemeClr val="accent1"/>
+            </a:fillRef>
+            <a:effectRef idx="0">
+              <a:schemeClr val="accent1"/>
+            </a:effectRef>
+            <a:fontRef idx="minor">
+              <a:schemeClr val="tx1"/>
+            </a:fontRef>
+          </p:style>
+        </p:cxnSp>
+        <p:cxnSp>
+          <p:nvCxnSpPr>
+            <p:cNvPr id="31" name="Straight Connector 30"/>
+            <p:cNvCxnSpPr>
+              <a:stCxn id="26" idx="3"/>
+              <a:endCxn id="28" idx="1"/>
+            </p:cNvCxnSpPr>
+            <p:nvPr/>
+          </p:nvCxnSpPr>
+          <p:spPr>
+            <a:xfrm>
+              <a:off x="3526971" y="1066801"/>
+              <a:ext cx="163285" cy="195942"/>
+            </a:xfrm>
+            <a:prstGeom prst="line">
+              <a:avLst/>
+            </a:prstGeom>
+            <a:ln w="25400">
+              <a:solidFill>
+                <a:schemeClr val="tx1"/>
+              </a:solidFill>
+            </a:ln>
+          </p:spPr>
+          <p:style>
+            <a:lnRef idx="1">
+              <a:schemeClr val="accent1"/>
+            </a:lnRef>
+            <a:fillRef idx="0">
+              <a:schemeClr val="accent1"/>
+            </a:fillRef>
+            <a:effectRef idx="0">
+              <a:schemeClr val="accent1"/>
+            </a:effectRef>
+            <a:fontRef idx="minor">
+              <a:schemeClr val="tx1"/>
+            </a:fontRef>
+          </p:style>
+        </p:cxnSp>
+      </p:grpSp>
+      <p:grpSp>
+        <p:nvGrpSpPr>
+          <p:cNvPr id="42" name="Group 41"/>
+          <p:cNvGrpSpPr/>
+          <p:nvPr/>
+        </p:nvGrpSpPr>
+        <p:grpSpPr>
+          <a:xfrm>
+            <a:off x="2623457" y="3570514"/>
+            <a:ext cx="674913" cy="555172"/>
+            <a:chOff x="3276600" y="816428"/>
+            <a:chExt cx="674913" cy="555172"/>
+          </a:xfrm>
+        </p:grpSpPr>
+        <p:sp>
+          <p:nvSpPr>
+            <p:cNvPr id="43" name="Rectangle 42"/>
+            <p:cNvSpPr/>
+            <p:nvPr/>
+          </p:nvSpPr>
+          <p:spPr>
+            <a:xfrm>
+              <a:off x="3276600" y="957943"/>
+              <a:ext cx="250371" cy="217715"/>
+            </a:xfrm>
+            <a:prstGeom prst="rect">
+              <a:avLst/>
+            </a:prstGeom>
+            <a:solidFill>
+              <a:schemeClr val="bg2">
+                <a:lumMod val="75000"/>
+              </a:schemeClr>
+            </a:solidFill>
+            <a:ln>
+              <a:solidFill>
+                <a:schemeClr val="tx1"/>
+              </a:solidFill>
+            </a:ln>
+          </p:spPr>
+          <p:style>
+            <a:lnRef idx="2">
+              <a:schemeClr val="accent1">
+                <a:shade val="50000"/>
+              </a:schemeClr>
+            </a:lnRef>
+            <a:fillRef idx="1">
+              <a:schemeClr val="accent1"/>
+            </a:fillRef>
+            <a:effectRef idx="0">
+              <a:schemeClr val="accent1"/>
+            </a:effectRef>
+            <a:fontRef idx="minor">
+              <a:schemeClr val="lt1"/>
+            </a:fontRef>
+          </p:style>
+          <p:txBody>
+            <a:bodyPr rtlCol="0" anchor="ctr"/>
+            <a:lstStyle/>
+            <a:p>
+              <a:pPr algn="ctr"/>
+              <a:endParaRPr lang="en-US"/>
+            </a:p>
+          </p:txBody>
+        </p:sp>
+        <p:sp>
+          <p:nvSpPr>
+            <p:cNvPr id="44" name="Rectangle 43"/>
+            <p:cNvSpPr/>
+            <p:nvPr/>
+          </p:nvSpPr>
+          <p:spPr>
+            <a:xfrm>
+              <a:off x="3701142" y="816428"/>
+              <a:ext cx="250371" cy="217715"/>
+            </a:xfrm>
+            <a:prstGeom prst="rect">
+              <a:avLst/>
+            </a:prstGeom>
+            <a:solidFill>
+              <a:schemeClr val="bg2">
+                <a:lumMod val="75000"/>
+              </a:schemeClr>
+            </a:solidFill>
+            <a:ln>
+              <a:solidFill>
+                <a:schemeClr val="tx1"/>
+              </a:solidFill>
+            </a:ln>
+          </p:spPr>
+          <p:style>
+            <a:lnRef idx="2">
+              <a:schemeClr val="accent1">
+                <a:shade val="50000"/>
+              </a:schemeClr>
+            </a:lnRef>
+            <a:fillRef idx="1">
+              <a:schemeClr val="accent1"/>
+            </a:fillRef>
+            <a:effectRef idx="0">
+              <a:schemeClr val="accent1"/>
+            </a:effectRef>
+            <a:fontRef idx="minor">
+              <a:schemeClr val="lt1"/>
+            </a:fontRef>
+          </p:style>
+          <p:txBody>
+            <a:bodyPr rtlCol="0" anchor="ctr"/>
+            <a:lstStyle/>
+            <a:p>
+              <a:pPr algn="ctr"/>
+              <a:endParaRPr lang="en-US"/>
+            </a:p>
+          </p:txBody>
+        </p:sp>
+        <p:sp>
+          <p:nvSpPr>
+            <p:cNvPr id="45" name="Rectangle 44"/>
+            <p:cNvSpPr/>
+            <p:nvPr/>
+          </p:nvSpPr>
+          <p:spPr>
+            <a:xfrm>
+              <a:off x="3690256" y="1153885"/>
+              <a:ext cx="250371" cy="217715"/>
+            </a:xfrm>
+            <a:prstGeom prst="rect">
+              <a:avLst/>
+            </a:prstGeom>
+            <a:solidFill>
+              <a:schemeClr val="bg2">
+                <a:lumMod val="75000"/>
+              </a:schemeClr>
+            </a:solidFill>
+            <a:ln>
+              <a:solidFill>
+                <a:schemeClr val="tx1"/>
+              </a:solidFill>
+            </a:ln>
+          </p:spPr>
+          <p:style>
+            <a:lnRef idx="2">
+              <a:schemeClr val="accent1">
+                <a:shade val="50000"/>
+              </a:schemeClr>
+            </a:lnRef>
+            <a:fillRef idx="1">
+              <a:schemeClr val="accent1"/>
+            </a:fillRef>
+            <a:effectRef idx="0">
+              <a:schemeClr val="accent1"/>
+            </a:effectRef>
+            <a:fontRef idx="minor">
+              <a:schemeClr val="lt1"/>
+            </a:fontRef>
+          </p:style>
+          <p:txBody>
+            <a:bodyPr rtlCol="0" anchor="ctr"/>
+            <a:lstStyle/>
+            <a:p>
+              <a:pPr algn="ctr"/>
+              <a:endParaRPr lang="en-US"/>
+            </a:p>
+          </p:txBody>
+        </p:sp>
+        <p:cxnSp>
+          <p:nvCxnSpPr>
+            <p:cNvPr id="46" name="Straight Connector 45"/>
+            <p:cNvCxnSpPr>
+              <a:stCxn id="43" idx="3"/>
+              <a:endCxn id="44" idx="1"/>
+            </p:cNvCxnSpPr>
+            <p:nvPr/>
+          </p:nvCxnSpPr>
+          <p:spPr>
+            <a:xfrm flipV="1">
+              <a:off x="3526971" y="925286"/>
+              <a:ext cx="174171" cy="141515"/>
+            </a:xfrm>
+            <a:prstGeom prst="line">
+              <a:avLst/>
+            </a:prstGeom>
+            <a:ln w="25400">
+              <a:solidFill>
+                <a:schemeClr val="tx1"/>
+              </a:solidFill>
+            </a:ln>
+          </p:spPr>
+          <p:style>
+            <a:lnRef idx="1">
+              <a:schemeClr val="accent1"/>
+            </a:lnRef>
+            <a:fillRef idx="0">
+              <a:schemeClr val="accent1"/>
+            </a:fillRef>
+            <a:effectRef idx="0">
+              <a:schemeClr val="accent1"/>
+            </a:effectRef>
+            <a:fontRef idx="minor">
+              <a:schemeClr val="tx1"/>
+            </a:fontRef>
+          </p:style>
+        </p:cxnSp>
+        <p:cxnSp>
+          <p:nvCxnSpPr>
+            <p:cNvPr id="47" name="Straight Connector 46"/>
+            <p:cNvCxnSpPr>
+              <a:stCxn id="43" idx="3"/>
+              <a:endCxn id="45" idx="1"/>
+            </p:cNvCxnSpPr>
+            <p:nvPr/>
+          </p:nvCxnSpPr>
+          <p:spPr>
+            <a:xfrm>
+              <a:off x="3526971" y="1066801"/>
+              <a:ext cx="163285" cy="195942"/>
+            </a:xfrm>
+            <a:prstGeom prst="line">
+              <a:avLst/>
+            </a:prstGeom>
+            <a:ln w="25400">
+              <a:solidFill>
+                <a:schemeClr val="tx1"/>
+              </a:solidFill>
+            </a:ln>
+          </p:spPr>
+          <p:style>
+            <a:lnRef idx="1">
+              <a:schemeClr val="accent1"/>
+            </a:lnRef>
+            <a:fillRef idx="0">
+              <a:schemeClr val="accent1"/>
+            </a:fillRef>
+            <a:effectRef idx="0">
+              <a:schemeClr val="accent1"/>
+            </a:effectRef>
+            <a:fontRef idx="minor">
+              <a:schemeClr val="tx1"/>
+            </a:fontRef>
+          </p:style>
+        </p:cxnSp>
+      </p:grpSp>
+      <p:grpSp>
+        <p:nvGrpSpPr>
+          <p:cNvPr id="48" name="Group 47"/>
+          <p:cNvGrpSpPr/>
+          <p:nvPr/>
+        </p:nvGrpSpPr>
+        <p:grpSpPr>
+          <a:xfrm>
+            <a:off x="4343400" y="4267199"/>
+            <a:ext cx="674913" cy="555172"/>
+            <a:chOff x="3276600" y="816428"/>
+            <a:chExt cx="674913" cy="555172"/>
+          </a:xfrm>
+        </p:grpSpPr>
+        <p:sp>
+          <p:nvSpPr>
+            <p:cNvPr id="49" name="Rectangle 48"/>
+            <p:cNvSpPr/>
+            <p:nvPr/>
+          </p:nvSpPr>
+          <p:spPr>
+            <a:xfrm>
+              <a:off x="3276600" y="957943"/>
+              <a:ext cx="250371" cy="217715"/>
+            </a:xfrm>
+            <a:prstGeom prst="rect">
+              <a:avLst/>
+            </a:prstGeom>
+            <a:solidFill>
+              <a:schemeClr val="bg2">
+                <a:lumMod val="75000"/>
+              </a:schemeClr>
+            </a:solidFill>
+            <a:ln>
+              <a:solidFill>
+                <a:schemeClr val="tx1"/>
+              </a:solidFill>
+            </a:ln>
+          </p:spPr>
+          <p:style>
+            <a:lnRef idx="2">
+              <a:schemeClr val="accent1">
+                <a:shade val="50000"/>
+              </a:schemeClr>
+            </a:lnRef>
+            <a:fillRef idx="1">
+              <a:schemeClr val="accent1"/>
+            </a:fillRef>
+            <a:effectRef idx="0">
+              <a:schemeClr val="accent1"/>
+            </a:effectRef>
+            <a:fontRef idx="minor">
+              <a:schemeClr val="lt1"/>
+            </a:fontRef>
+          </p:style>
+          <p:txBody>
+            <a:bodyPr rtlCol="0" anchor="ctr"/>
+            <a:lstStyle/>
+            <a:p>
+              <a:pPr algn="ctr"/>
+              <a:endParaRPr lang="en-US"/>
+            </a:p>
+          </p:txBody>
+        </p:sp>
+        <p:sp>
+          <p:nvSpPr>
+            <p:cNvPr id="50" name="Rectangle 49"/>
+            <p:cNvSpPr/>
+            <p:nvPr/>
+          </p:nvSpPr>
+          <p:spPr>
+            <a:xfrm>
+              <a:off x="3701142" y="816428"/>
+              <a:ext cx="250371" cy="217715"/>
+            </a:xfrm>
+            <a:prstGeom prst="rect">
+              <a:avLst/>
+            </a:prstGeom>
+            <a:solidFill>
+              <a:schemeClr val="bg2">
+                <a:lumMod val="75000"/>
+              </a:schemeClr>
+            </a:solidFill>
+            <a:ln>
+              <a:solidFill>
+                <a:schemeClr val="tx1"/>
+              </a:solidFill>
+            </a:ln>
+          </p:spPr>
+          <p:style>
+            <a:lnRef idx="2">
+              <a:schemeClr val="accent1">
+                <a:shade val="50000"/>
+              </a:schemeClr>
+            </a:lnRef>
+            <a:fillRef idx="1">
+              <a:schemeClr val="accent1"/>
+            </a:fillRef>
+            <a:effectRef idx="0">
+              <a:schemeClr val="accent1"/>
+            </a:effectRef>
+            <a:fontRef idx="minor">
+              <a:schemeClr val="lt1"/>
+            </a:fontRef>
+          </p:style>
+          <p:txBody>
+            <a:bodyPr rtlCol="0" anchor="ctr"/>
+            <a:lstStyle/>
+            <a:p>
+              <a:pPr algn="ctr"/>
+              <a:endParaRPr lang="en-US"/>
+            </a:p>
+          </p:txBody>
+        </p:sp>
+        <p:sp>
+          <p:nvSpPr>
+            <p:cNvPr id="51" name="Rectangle 50"/>
+            <p:cNvSpPr/>
+            <p:nvPr/>
+          </p:nvSpPr>
+          <p:spPr>
+            <a:xfrm>
+              <a:off x="3690256" y="1153885"/>
+              <a:ext cx="250371" cy="217715"/>
+            </a:xfrm>
+            <a:prstGeom prst="rect">
+              <a:avLst/>
+            </a:prstGeom>
+            <a:solidFill>
+              <a:schemeClr val="bg2">
+                <a:lumMod val="75000"/>
+              </a:schemeClr>
+            </a:solidFill>
+            <a:ln>
+              <a:solidFill>
+                <a:schemeClr val="tx1"/>
+              </a:solidFill>
+            </a:ln>
+          </p:spPr>
+          <p:style>
+            <a:lnRef idx="2">
+              <a:schemeClr val="accent1">
+                <a:shade val="50000"/>
+              </a:schemeClr>
+            </a:lnRef>
+            <a:fillRef idx="1">
+              <a:schemeClr val="accent1"/>
+            </a:fillRef>
+            <a:effectRef idx="0">
+              <a:schemeClr val="accent1"/>
+            </a:effectRef>
+            <a:fontRef idx="minor">
+              <a:schemeClr val="lt1"/>
+            </a:fontRef>
+          </p:style>
+          <p:txBody>
+            <a:bodyPr rtlCol="0" anchor="ctr"/>
+            <a:lstStyle/>
+            <a:p>
+              <a:pPr algn="ctr"/>
+              <a:endParaRPr lang="en-US"/>
+            </a:p>
+          </p:txBody>
+        </p:sp>
+        <p:cxnSp>
+          <p:nvCxnSpPr>
+            <p:cNvPr id="52" name="Straight Connector 51"/>
+            <p:cNvCxnSpPr>
+              <a:stCxn id="49" idx="3"/>
+              <a:endCxn id="50" idx="1"/>
+            </p:cNvCxnSpPr>
+            <p:nvPr/>
+          </p:nvCxnSpPr>
+          <p:spPr>
+            <a:xfrm flipV="1">
+              <a:off x="3526971" y="925286"/>
+              <a:ext cx="174171" cy="141515"/>
+            </a:xfrm>
+            <a:prstGeom prst="line">
+              <a:avLst/>
+            </a:prstGeom>
+            <a:ln w="25400">
+              <a:solidFill>
+                <a:schemeClr val="tx1"/>
+              </a:solidFill>
+            </a:ln>
+          </p:spPr>
+          <p:style>
+            <a:lnRef idx="1">
+              <a:schemeClr val="accent1"/>
+            </a:lnRef>
+            <a:fillRef idx="0">
+              <a:schemeClr val="accent1"/>
+            </a:fillRef>
+            <a:effectRef idx="0">
+              <a:schemeClr val="accent1"/>
+            </a:effectRef>
+            <a:fontRef idx="minor">
+              <a:schemeClr val="tx1"/>
+            </a:fontRef>
+          </p:style>
+        </p:cxnSp>
+        <p:cxnSp>
+          <p:nvCxnSpPr>
+            <p:cNvPr id="53" name="Straight Connector 52"/>
+            <p:cNvCxnSpPr>
+              <a:stCxn id="49" idx="3"/>
+              <a:endCxn id="51" idx="1"/>
+            </p:cNvCxnSpPr>
+            <p:nvPr/>
+          </p:nvCxnSpPr>
+          <p:spPr>
+            <a:xfrm>
+              <a:off x="3526971" y="1066801"/>
+              <a:ext cx="163285" cy="195942"/>
+            </a:xfrm>
+            <a:prstGeom prst="line">
+              <a:avLst/>
+            </a:prstGeom>
+            <a:ln w="25400">
+              <a:solidFill>
+                <a:schemeClr val="tx1"/>
+              </a:solidFill>
+            </a:ln>
+          </p:spPr>
+          <p:style>
+            <a:lnRef idx="1">
+              <a:schemeClr val="accent1"/>
+            </a:lnRef>
+            <a:fillRef idx="0">
+              <a:schemeClr val="accent1"/>
+            </a:fillRef>
+            <a:effectRef idx="0">
+              <a:schemeClr val="accent1"/>
+            </a:effectRef>
+            <a:fontRef idx="minor">
+              <a:schemeClr val="tx1"/>
+            </a:fontRef>
+          </p:style>
+        </p:cxnSp>
+      </p:grpSp>
+      <p:grpSp>
+        <p:nvGrpSpPr>
+          <p:cNvPr id="54" name="Group 53"/>
+          <p:cNvGrpSpPr/>
+          <p:nvPr/>
+        </p:nvGrpSpPr>
+        <p:grpSpPr>
+          <a:xfrm>
+            <a:off x="6955971" y="3929743"/>
+            <a:ext cx="674913" cy="555172"/>
+            <a:chOff x="3276600" y="816428"/>
+            <a:chExt cx="674913" cy="555172"/>
+          </a:xfrm>
+        </p:grpSpPr>
+        <p:sp>
+          <p:nvSpPr>
+            <p:cNvPr id="55" name="Rectangle 54"/>
+            <p:cNvSpPr/>
+            <p:nvPr/>
+          </p:nvSpPr>
+          <p:spPr>
+            <a:xfrm>
+              <a:off x="3276600" y="957943"/>
+              <a:ext cx="250371" cy="217715"/>
+            </a:xfrm>
+            <a:prstGeom prst="rect">
+              <a:avLst/>
+            </a:prstGeom>
+            <a:solidFill>
+              <a:schemeClr val="bg2">
+                <a:lumMod val="75000"/>
+              </a:schemeClr>
+            </a:solidFill>
+            <a:ln>
+              <a:solidFill>
+                <a:schemeClr val="tx1"/>
+              </a:solidFill>
+            </a:ln>
+          </p:spPr>
+          <p:style>
+            <a:lnRef idx="2">
+              <a:schemeClr val="accent1">
+                <a:shade val="50000"/>
+              </a:schemeClr>
+            </a:lnRef>
+            <a:fillRef idx="1">
+              <a:schemeClr val="accent1"/>
+            </a:fillRef>
+            <a:effectRef idx="0">
+              <a:schemeClr val="accent1"/>
+            </a:effectRef>
+            <a:fontRef idx="minor">
+              <a:schemeClr val="lt1"/>
+            </a:fontRef>
+          </p:style>
+          <p:txBody>
+            <a:bodyPr rtlCol="0" anchor="ctr"/>
+            <a:lstStyle/>
+            <a:p>
+              <a:pPr algn="ctr"/>
+              <a:endParaRPr lang="en-US"/>
+            </a:p>
+          </p:txBody>
+        </p:sp>
+        <p:sp>
+          <p:nvSpPr>
+            <p:cNvPr id="56" name="Rectangle 55"/>
+            <p:cNvSpPr/>
+            <p:nvPr/>
+          </p:nvSpPr>
+          <p:spPr>
+            <a:xfrm>
+              <a:off x="3701142" y="816428"/>
+              <a:ext cx="250371" cy="217715"/>
+            </a:xfrm>
+            <a:prstGeom prst="rect">
+              <a:avLst/>
+            </a:prstGeom>
+            <a:solidFill>
+              <a:schemeClr val="bg2">
+                <a:lumMod val="75000"/>
+              </a:schemeClr>
+            </a:solidFill>
+            <a:ln>
+              <a:solidFill>
+                <a:schemeClr val="tx1"/>
+              </a:solidFill>
+            </a:ln>
+          </p:spPr>
+          <p:style>
+            <a:lnRef idx="2">
+              <a:schemeClr val="accent1">
+                <a:shade val="50000"/>
+              </a:schemeClr>
+            </a:lnRef>
+            <a:fillRef idx="1">
+              <a:schemeClr val="accent1"/>
+            </a:fillRef>
+            <a:effectRef idx="0">
+              <a:schemeClr val="accent1"/>
+            </a:effectRef>
+            <a:fontRef idx="minor">
+              <a:schemeClr val="lt1"/>
+            </a:fontRef>
+          </p:style>
+          <p:txBody>
+            <a:bodyPr rtlCol="0" anchor="ctr"/>
+            <a:lstStyle/>
+            <a:p>
+              <a:pPr algn="ctr"/>
+              <a:endParaRPr lang="en-US"/>
+            </a:p>
+          </p:txBody>
+        </p:sp>
+        <p:sp>
+          <p:nvSpPr>
+            <p:cNvPr id="57" name="Rectangle 56"/>
+            <p:cNvSpPr/>
+            <p:nvPr/>
+          </p:nvSpPr>
+          <p:spPr>
+            <a:xfrm>
+              <a:off x="3690256" y="1153885"/>
+              <a:ext cx="250371" cy="217715"/>
+            </a:xfrm>
+            <a:prstGeom prst="rect">
+              <a:avLst/>
+            </a:prstGeom>
+            <a:solidFill>
+              <a:schemeClr val="bg2">
+                <a:lumMod val="75000"/>
+              </a:schemeClr>
+            </a:solidFill>
+            <a:ln>
+              <a:solidFill>
+                <a:schemeClr val="tx1"/>
+              </a:solidFill>
+            </a:ln>
+          </p:spPr>
+          <p:style>
+            <a:lnRef idx="2">
+              <a:schemeClr val="accent1">
+                <a:shade val="50000"/>
+              </a:schemeClr>
+            </a:lnRef>
+            <a:fillRef idx="1">
+              <a:schemeClr val="accent1"/>
+            </a:fillRef>
+            <a:effectRef idx="0">
+              <a:schemeClr val="accent1"/>
+            </a:effectRef>
+            <a:fontRef idx="minor">
+              <a:schemeClr val="lt1"/>
+            </a:fontRef>
+          </p:style>
+          <p:txBody>
+            <a:bodyPr rtlCol="0" anchor="ctr"/>
+            <a:lstStyle/>
+            <a:p>
+              <a:pPr algn="ctr"/>
+              <a:endParaRPr lang="en-US"/>
+            </a:p>
+          </p:txBody>
+        </p:sp>
+        <p:cxnSp>
+          <p:nvCxnSpPr>
+            <p:cNvPr id="58" name="Straight Connector 57"/>
+            <p:cNvCxnSpPr>
+              <a:stCxn id="55" idx="3"/>
+              <a:endCxn id="56" idx="1"/>
+            </p:cNvCxnSpPr>
+            <p:nvPr/>
+          </p:nvCxnSpPr>
+          <p:spPr>
+            <a:xfrm flipV="1">
+              <a:off x="3526971" y="925286"/>
+              <a:ext cx="174171" cy="141515"/>
+            </a:xfrm>
+            <a:prstGeom prst="line">
+              <a:avLst/>
+            </a:prstGeom>
+            <a:ln w="25400">
+              <a:solidFill>
+                <a:schemeClr val="tx1"/>
+              </a:solidFill>
+            </a:ln>
+          </p:spPr>
+          <p:style>
+            <a:lnRef idx="1">
+              <a:schemeClr val="accent1"/>
+            </a:lnRef>
+            <a:fillRef idx="0">
+              <a:schemeClr val="accent1"/>
+            </a:fillRef>
+            <a:effectRef idx="0">
+              <a:schemeClr val="accent1"/>
+            </a:effectRef>
+            <a:fontRef idx="minor">
+              <a:schemeClr val="tx1"/>
+            </a:fontRef>
+          </p:style>
+        </p:cxnSp>
+        <p:cxnSp>
+          <p:nvCxnSpPr>
+            <p:cNvPr id="59" name="Straight Connector 58"/>
+            <p:cNvCxnSpPr>
+              <a:stCxn id="55" idx="3"/>
+              <a:endCxn id="57" idx="1"/>
+            </p:cNvCxnSpPr>
+            <p:nvPr/>
+          </p:nvCxnSpPr>
+          <p:spPr>
+            <a:xfrm>
+              <a:off x="3526971" y="1066801"/>
+              <a:ext cx="163285" cy="195942"/>
+            </a:xfrm>
+            <a:prstGeom prst="line">
+              <a:avLst/>
+            </a:prstGeom>
+            <a:ln w="25400">
+              <a:solidFill>
+                <a:schemeClr val="tx1"/>
+              </a:solidFill>
+            </a:ln>
+          </p:spPr>
+          <p:style>
+            <a:lnRef idx="1">
+              <a:schemeClr val="accent1"/>
+            </a:lnRef>
+            <a:fillRef idx="0">
+              <a:schemeClr val="accent1"/>
+            </a:fillRef>
+            <a:effectRef idx="0">
+              <a:schemeClr val="accent1"/>
+            </a:effectRef>
+            <a:fontRef idx="minor">
+              <a:schemeClr val="tx1"/>
+            </a:fontRef>
+          </p:style>
+        </p:cxnSp>
+      </p:grpSp>
+    </p:spTree>
+  </p:cSld>
+  <p:clrMapOvr>
+    <a:masterClrMapping/>
+  </p:clrMapOvr>
+</p:sld>
+</file>
+
+<file path=ppt/slides/slide4.xml><?xml version="1.0" encoding="utf-8"?>
+<p:sld xmlns:a="http://schemas.openxmlformats.org/drawingml/2006/main" xmlns:r="http://schemas.openxmlformats.org/officeDocument/2006/relationships" xmlns:p="http://schemas.openxmlformats.org/presentationml/2006/main">
+  <p:cSld>
+    <p:spTree>
+      <p:nvGrpSpPr>
+        <p:cNvPr id="1" name=""/>
+        <p:cNvGrpSpPr/>
+        <p:nvPr/>
+      </p:nvGrpSpPr>
+      <p:grpSpPr>
+        <a:xfrm>
+          <a:off x="0" y="0"/>
+          <a:ext cx="0" cy="0"/>
+          <a:chOff x="0" y="0"/>
+          <a:chExt cx="0" cy="0"/>
+        </a:xfrm>
+      </p:grpSpPr>
+      <p:sp>
+        <p:nvSpPr>
           <p:cNvPr id="39" name="Rounded Rectangle 38"/>
           <p:cNvSpPr/>
           <p:nvPr/>
@@ -5442,7 +8542,7 @@
 </p:sld>
 </file>
 
-<file path=ppt/slides/slide2.xml><?xml version="1.0" encoding="utf-8"?>
+<file path=ppt/slides/slide5.xml><?xml version="1.0" encoding="utf-8"?>
 <p:sld xmlns:a="http://schemas.openxmlformats.org/drawingml/2006/main" xmlns:r="http://schemas.openxmlformats.org/officeDocument/2006/relationships" xmlns:p="http://schemas.openxmlformats.org/presentationml/2006/main">
   <p:cSld>
     <p:spTree>
@@ -8739,7 +11839,7 @@
 </p:sld>
 </file>
 
-<file path=ppt/slides/slide3.xml><?xml version="1.0" encoding="utf-8"?>
+<file path=ppt/slides/slide6.xml><?xml version="1.0" encoding="utf-8"?>
 <p:sld xmlns:a="http://schemas.openxmlformats.org/drawingml/2006/main" xmlns:r="http://schemas.openxmlformats.org/officeDocument/2006/relationships" xmlns:p="http://schemas.openxmlformats.org/presentationml/2006/main">
   <p:cSld>
     <p:spTree>
@@ -10046,7 +13146,7 @@
 </p:sld>
 </file>
 
-<file path=ppt/slides/slide4.xml><?xml version="1.0" encoding="utf-8"?>
+<file path=ppt/slides/slide7.xml><?xml version="1.0" encoding="utf-8"?>
 <p:sld xmlns:a="http://schemas.openxmlformats.org/drawingml/2006/main" xmlns:r="http://schemas.openxmlformats.org/officeDocument/2006/relationships" xmlns:p="http://schemas.openxmlformats.org/presentationml/2006/main">
   <p:cSld>
     <p:spTree>

</xml_diff>